<commit_message>
add performance test; IDE use Goland and PyCharm
</commit_message>
<xml_diff>
--- a/doc/GoCRMS.pptx
+++ b/doc/GoCRMS.pptx
@@ -15,11 +15,12 @@
     <p:sldId id="263" r:id="rId9"/>
     <p:sldId id="264" r:id="rId10"/>
     <p:sldId id="265" r:id="rId11"/>
-    <p:sldId id="267" r:id="rId12"/>
-    <p:sldId id="266" r:id="rId13"/>
-    <p:sldId id="268" r:id="rId14"/>
-    <p:sldId id="269" r:id="rId15"/>
-    <p:sldId id="271" r:id="rId16"/>
+    <p:sldId id="272" r:id="rId12"/>
+    <p:sldId id="267" r:id="rId13"/>
+    <p:sldId id="266" r:id="rId14"/>
+    <p:sldId id="268" r:id="rId15"/>
+    <p:sldId id="269" r:id="rId16"/>
+    <p:sldId id="271" r:id="rId17"/>
   </p:sldIdLst>
   <p:sldSz cx="12192000" cy="6858000"/>
   <p:notesSz cx="6858000" cy="9144000"/>
@@ -118,7 +119,16 @@
       </a:defRPr>
     </a:lvl9pPr>
   </p:defaultTextStyle>
+  <p:extLst>
+    <p:ext uri="{EFAFB233-063F-42B5-8137-9DF3F51BA10A}">
+      <p15:sldGuideLst xmlns:p15="http://schemas.microsoft.com/office/powerpoint/2012/main"/>
+    </p:ext>
+  </p:extLst>
 </p:presentation>
+</file>
+
+<file path=ppt/revisionInfo.xml><?xml version="1.0" encoding="utf-8"?>
+<p1510:revInfo xmlns:a="http://schemas.openxmlformats.org/drawingml/2006/main" xmlns:r="http://schemas.openxmlformats.org/officeDocument/2006/relationships" xmlns:p1510="http://schemas.microsoft.com/office/powerpoint/2015/10/main"/>
 </file>
 
 <file path=ppt/slideLayouts/slideLayout1.xml><?xml version="1.0" encoding="utf-8"?>
@@ -268,7 +278,7 @@
           <a:p>
             <a:fld id="{5ADE3BBA-DA9C-4A11-A3AF-5E75F56F5E8B}" type="datetimeFigureOut">
               <a:rPr lang="en-US" smtClean="0"/>
-              <a:t>3/13/2018</a:t>
+              <a:t>3/14/2018</a:t>
             </a:fld>
             <a:endParaRPr lang="en-US"/>
           </a:p>
@@ -466,7 +476,7 @@
           <a:p>
             <a:fld id="{5ADE3BBA-DA9C-4A11-A3AF-5E75F56F5E8B}" type="datetimeFigureOut">
               <a:rPr lang="en-US" smtClean="0"/>
-              <a:t>3/13/2018</a:t>
+              <a:t>3/14/2018</a:t>
             </a:fld>
             <a:endParaRPr lang="en-US"/>
           </a:p>
@@ -674,7 +684,7 @@
           <a:p>
             <a:fld id="{5ADE3BBA-DA9C-4A11-A3AF-5E75F56F5E8B}" type="datetimeFigureOut">
               <a:rPr lang="en-US" smtClean="0"/>
-              <a:t>3/13/2018</a:t>
+              <a:t>3/14/2018</a:t>
             </a:fld>
             <a:endParaRPr lang="en-US"/>
           </a:p>
@@ -872,7 +882,7 @@
           <a:p>
             <a:fld id="{5ADE3BBA-DA9C-4A11-A3AF-5E75F56F5E8B}" type="datetimeFigureOut">
               <a:rPr lang="en-US" smtClean="0"/>
-              <a:t>3/13/2018</a:t>
+              <a:t>3/14/2018</a:t>
             </a:fld>
             <a:endParaRPr lang="en-US"/>
           </a:p>
@@ -1147,7 +1157,7 @@
           <a:p>
             <a:fld id="{5ADE3BBA-DA9C-4A11-A3AF-5E75F56F5E8B}" type="datetimeFigureOut">
               <a:rPr lang="en-US" smtClean="0"/>
-              <a:t>3/13/2018</a:t>
+              <a:t>3/14/2018</a:t>
             </a:fld>
             <a:endParaRPr lang="en-US"/>
           </a:p>
@@ -1412,7 +1422,7 @@
           <a:p>
             <a:fld id="{5ADE3BBA-DA9C-4A11-A3AF-5E75F56F5E8B}" type="datetimeFigureOut">
               <a:rPr lang="en-US" smtClean="0"/>
-              <a:t>3/13/2018</a:t>
+              <a:t>3/14/2018</a:t>
             </a:fld>
             <a:endParaRPr lang="en-US"/>
           </a:p>
@@ -1824,7 +1834,7 @@
           <a:p>
             <a:fld id="{5ADE3BBA-DA9C-4A11-A3AF-5E75F56F5E8B}" type="datetimeFigureOut">
               <a:rPr lang="en-US" smtClean="0"/>
-              <a:t>3/13/2018</a:t>
+              <a:t>3/14/2018</a:t>
             </a:fld>
             <a:endParaRPr lang="en-US"/>
           </a:p>
@@ -1965,7 +1975,7 @@
           <a:p>
             <a:fld id="{5ADE3BBA-DA9C-4A11-A3AF-5E75F56F5E8B}" type="datetimeFigureOut">
               <a:rPr lang="en-US" smtClean="0"/>
-              <a:t>3/13/2018</a:t>
+              <a:t>3/14/2018</a:t>
             </a:fld>
             <a:endParaRPr lang="en-US"/>
           </a:p>
@@ -2078,7 +2088,7 @@
           <a:p>
             <a:fld id="{5ADE3BBA-DA9C-4A11-A3AF-5E75F56F5E8B}" type="datetimeFigureOut">
               <a:rPr lang="en-US" smtClean="0"/>
-              <a:t>3/13/2018</a:t>
+              <a:t>3/14/2018</a:t>
             </a:fld>
             <a:endParaRPr lang="en-US"/>
           </a:p>
@@ -2389,7 +2399,7 @@
           <a:p>
             <a:fld id="{5ADE3BBA-DA9C-4A11-A3AF-5E75F56F5E8B}" type="datetimeFigureOut">
               <a:rPr lang="en-US" smtClean="0"/>
-              <a:t>3/13/2018</a:t>
+              <a:t>3/14/2018</a:t>
             </a:fld>
             <a:endParaRPr lang="en-US"/>
           </a:p>
@@ -2677,7 +2687,7 @@
           <a:p>
             <a:fld id="{5ADE3BBA-DA9C-4A11-A3AF-5E75F56F5E8B}" type="datetimeFigureOut">
               <a:rPr lang="en-US" smtClean="0"/>
-              <a:t>3/13/2018</a:t>
+              <a:t>3/14/2018</a:t>
             </a:fld>
             <a:endParaRPr lang="en-US"/>
           </a:p>
@@ -2918,7 +2928,7 @@
           <a:p>
             <a:fld id="{5ADE3BBA-DA9C-4A11-A3AF-5E75F56F5E8B}" type="datetimeFigureOut">
               <a:rPr lang="en-US" smtClean="0"/>
-              <a:t>3/13/2018</a:t>
+              <a:t>3/14/2018</a:t>
             </a:fld>
             <a:endParaRPr lang="en-US"/>
           </a:p>
@@ -3980,7 +3990,7 @@
         <p:spPr>
           <a:xfrm>
             <a:off x="611294" y="5983191"/>
-            <a:ext cx="516039" cy="369332"/>
+            <a:ext cx="516808" cy="369332"/>
           </a:xfrm>
           <a:prstGeom prst="rect">
             <a:avLst/>
@@ -3994,10 +4004,9 @@
           <a:lstStyle/>
           <a:p>
             <a:r>
-              <a:rPr lang="en-US" dirty="0" err="1"/>
-              <a:t>ratf</a:t>
-            </a:r>
-            <a:endParaRPr lang="en-US" dirty="0"/>
+              <a:rPr lang="en-US" dirty="0"/>
+              <a:t>raft</a:t>
+            </a:r>
           </a:p>
         </p:txBody>
       </p:sp>
@@ -4036,7 +4045,7 @@
           <p:cNvPr id="2" name="Title 1">
             <a:extLst>
               <a:ext uri="{FF2B5EF4-FFF2-40B4-BE49-F238E27FC236}">
-                <a16:creationId xmlns:a16="http://schemas.microsoft.com/office/drawing/2014/main" id="{AF714AA1-E32A-4687-BE66-7BE3DC8F71F2}"/>
+                <a16:creationId xmlns:a16="http://schemas.microsoft.com/office/drawing/2014/main" id="{173D2C31-694D-4BC1-9D4E-50C20D2247A6}"/>
               </a:ext>
             </a:extLst>
           </p:cNvPr>
@@ -4047,67 +4056,117 @@
             <p:ph type="title"/>
           </p:nvPr>
         </p:nvSpPr>
-        <p:spPr/>
+        <p:spPr>
+          <a:xfrm>
+            <a:off x="838200" y="365125"/>
+            <a:ext cx="10515600" cy="1181573"/>
+          </a:xfrm>
+        </p:spPr>
         <p:txBody>
           <a:bodyPr/>
           <a:lstStyle/>
           <a:p>
             <a:r>
               <a:rPr lang="en-US" dirty="0"/>
-              <a:t>TODO</a:t>
-            </a:r>
-          </a:p>
-        </p:txBody>
-      </p:sp>
-      <p:sp>
-        <p:nvSpPr>
-          <p:cNvPr id="3" name="Content Placeholder 2">
-            <a:extLst>
-              <a:ext uri="{FF2B5EF4-FFF2-40B4-BE49-F238E27FC236}">
-                <a16:creationId xmlns:a16="http://schemas.microsoft.com/office/drawing/2014/main" id="{1C78521B-370F-4CDC-BC8E-3D8A525B9244}"/>
-              </a:ext>
-            </a:extLst>
-          </p:cNvPr>
-          <p:cNvSpPr>
-            <a:spLocks noGrp="1"/>
-          </p:cNvSpPr>
-          <p:nvPr>
-            <p:ph idx="1"/>
-          </p:nvPr>
-        </p:nvSpPr>
-        <p:spPr/>
-        <p:txBody>
-          <a:bodyPr/>
-          <a:lstStyle/>
-          <a:p>
-            <a:r>
-              <a:rPr lang="en-US" dirty="0"/>
-              <a:t>Master</a:t>
-            </a:r>
-          </a:p>
-          <a:p>
-            <a:r>
-              <a:rPr lang="en-US" dirty="0"/>
-              <a:t>Load balance</a:t>
-            </a:r>
-          </a:p>
-          <a:p>
-            <a:r>
-              <a:rPr lang="en-US" dirty="0"/>
-              <a:t>Persistence </a:t>
-            </a:r>
-            <a:r>
-              <a:rPr lang="en-US"/>
-              <a:t>and recover</a:t>
-            </a:r>
-            <a:endParaRPr lang="en-US" dirty="0"/>
-          </a:p>
-        </p:txBody>
-      </p:sp>
+              <a:t>Web Service REST API</a:t>
+            </a:r>
+          </a:p>
+        </p:txBody>
+      </p:sp>
+      <p:pic>
+        <p:nvPicPr>
+          <p:cNvPr id="4" name="Picture 3">
+            <a:extLst>
+              <a:ext uri="{FF2B5EF4-FFF2-40B4-BE49-F238E27FC236}">
+                <a16:creationId xmlns:a16="http://schemas.microsoft.com/office/drawing/2014/main" id="{7D19CA28-A16E-42E3-BEC5-0D9058244F14}"/>
+              </a:ext>
+            </a:extLst>
+          </p:cNvPr>
+          <p:cNvPicPr>
+            <a:picLocks noChangeAspect="1"/>
+          </p:cNvPicPr>
+          <p:nvPr/>
+        </p:nvPicPr>
+        <p:blipFill>
+          <a:blip r:embed="rId2"/>
+          <a:stretch>
+            <a:fillRect/>
+          </a:stretch>
+        </p:blipFill>
+        <p:spPr>
+          <a:xfrm>
+            <a:off x="838200" y="1690688"/>
+            <a:ext cx="6000750" cy="2219325"/>
+          </a:xfrm>
+          <a:prstGeom prst="rect">
+            <a:avLst/>
+          </a:prstGeom>
+        </p:spPr>
+      </p:pic>
+      <p:pic>
+        <p:nvPicPr>
+          <p:cNvPr id="5" name="Picture 4">
+            <a:extLst>
+              <a:ext uri="{FF2B5EF4-FFF2-40B4-BE49-F238E27FC236}">
+                <a16:creationId xmlns:a16="http://schemas.microsoft.com/office/drawing/2014/main" id="{C2D93413-0B9E-42B4-9312-02C9EE3CB57C}"/>
+              </a:ext>
+            </a:extLst>
+          </p:cNvPr>
+          <p:cNvPicPr>
+            <a:picLocks noChangeAspect="1"/>
+          </p:cNvPicPr>
+          <p:nvPr/>
+        </p:nvPicPr>
+        <p:blipFill>
+          <a:blip r:embed="rId3"/>
+          <a:stretch>
+            <a:fillRect/>
+          </a:stretch>
+        </p:blipFill>
+        <p:spPr>
+          <a:xfrm>
+            <a:off x="838200" y="4385216"/>
+            <a:ext cx="7124700" cy="723900"/>
+          </a:xfrm>
+          <a:prstGeom prst="rect">
+            <a:avLst/>
+          </a:prstGeom>
+        </p:spPr>
+      </p:pic>
+      <p:pic>
+        <p:nvPicPr>
+          <p:cNvPr id="6" name="Picture 5">
+            <a:extLst>
+              <a:ext uri="{FF2B5EF4-FFF2-40B4-BE49-F238E27FC236}">
+                <a16:creationId xmlns:a16="http://schemas.microsoft.com/office/drawing/2014/main" id="{238F4DDA-B868-4DED-AE04-558E236E0793}"/>
+              </a:ext>
+            </a:extLst>
+          </p:cNvPr>
+          <p:cNvPicPr>
+            <a:picLocks noChangeAspect="1"/>
+          </p:cNvPicPr>
+          <p:nvPr/>
+        </p:nvPicPr>
+        <p:blipFill>
+          <a:blip r:embed="rId4"/>
+          <a:stretch>
+            <a:fillRect/>
+          </a:stretch>
+        </p:blipFill>
+        <p:spPr>
+          <a:xfrm>
+            <a:off x="838200" y="5720507"/>
+            <a:ext cx="5762625" cy="733425"/>
+          </a:xfrm>
+          <a:prstGeom prst="rect">
+            <a:avLst/>
+          </a:prstGeom>
+        </p:spPr>
+      </p:pic>
     </p:spTree>
     <p:extLst>
       <p:ext uri="{BB962C8B-B14F-4D97-AF65-F5344CB8AC3E}">
-        <p14:creationId xmlns:p14="http://schemas.microsoft.com/office/powerpoint/2010/main" val="3018931163"/>
+        <p14:creationId xmlns:p14="http://schemas.microsoft.com/office/powerpoint/2010/main" val="3666144855"/>
       </p:ext>
     </p:extLst>
   </p:cSld>
@@ -4139,7 +4198,7 @@
           <p:cNvPr id="2" name="Title 1">
             <a:extLst>
               <a:ext uri="{FF2B5EF4-FFF2-40B4-BE49-F238E27FC236}">
-                <a16:creationId xmlns:a16="http://schemas.microsoft.com/office/drawing/2014/main" id="{A5EE06EA-1EC6-4313-9D46-428B6BFAE98E}"/>
+                <a16:creationId xmlns:a16="http://schemas.microsoft.com/office/drawing/2014/main" id="{AF714AA1-E32A-4687-BE66-7BE3DC8F71F2}"/>
               </a:ext>
             </a:extLst>
           </p:cNvPr>
@@ -4157,7 +4216,7 @@
           <a:p>
             <a:r>
               <a:rPr lang="en-US" dirty="0"/>
-              <a:t>Master</a:t>
+              <a:t>TODO</a:t>
             </a:r>
           </a:p>
         </p:txBody>
@@ -4167,7 +4226,7 @@
           <p:cNvPr id="3" name="Content Placeholder 2">
             <a:extLst>
               <a:ext uri="{FF2B5EF4-FFF2-40B4-BE49-F238E27FC236}">
-                <a16:creationId xmlns:a16="http://schemas.microsoft.com/office/drawing/2014/main" id="{1497D334-1906-4524-B07B-CAD0DB8DB480}"/>
+                <a16:creationId xmlns:a16="http://schemas.microsoft.com/office/drawing/2014/main" id="{1C78521B-370F-4CDC-BC8E-3D8A525B9244}"/>
               </a:ext>
             </a:extLst>
           </p:cNvPr>
@@ -4178,409 +4237,92 @@
             <p:ph idx="1"/>
           </p:nvPr>
         </p:nvSpPr>
-        <p:spPr>
-          <a:xfrm>
-            <a:off x="526915" y="2334717"/>
-            <a:ext cx="10515600" cy="3917415"/>
-          </a:xfrm>
-        </p:spPr>
+        <p:spPr/>
         <p:txBody>
           <a:bodyPr>
-            <a:normAutofit/>
+            <a:normAutofit fontScale="77500" lnSpcReduction="20000"/>
           </a:bodyPr>
           <a:lstStyle/>
           <a:p>
             <a:r>
               <a:rPr lang="en-US" dirty="0"/>
-              <a:t>Leader election</a:t>
+              <a:t>Master</a:t>
+            </a:r>
+          </a:p>
+          <a:p>
+            <a:r>
+              <a:rPr lang="en-US" dirty="0"/>
+              <a:t>Load balance</a:t>
+            </a:r>
+          </a:p>
+          <a:p>
+            <a:r>
+              <a:rPr lang="en-US" dirty="0"/>
+              <a:t>Persistence and recover</a:t>
+            </a:r>
+          </a:p>
+          <a:p>
+            <a:r>
+              <a:rPr lang="en-US" dirty="0"/>
+              <a:t>Integrate into current system by adaptor</a:t>
             </a:r>
           </a:p>
           <a:p>
             <a:pPr lvl="1"/>
             <a:r>
               <a:rPr lang="en-US" dirty="0"/>
-              <a:t>The first one write the temp node “</a:t>
+              <a:t>Based on Python Client that shown in Page 7</a:t>
+            </a:r>
+          </a:p>
+          <a:p>
+            <a:r>
+              <a:rPr lang="en-US" dirty="0">
+                <a:solidFill>
+                  <a:srgbClr val="FF0000"/>
+                </a:solidFill>
+              </a:rPr>
+              <a:t>Stress test</a:t>
+            </a:r>
+          </a:p>
+          <a:p>
+            <a:r>
+              <a:rPr lang="en-US" dirty="0"/>
+              <a:t>Unit Test</a:t>
+            </a:r>
+          </a:p>
+          <a:p>
+            <a:r>
+              <a:rPr lang="en-US" dirty="0"/>
+              <a:t>Better look and feel web site</a:t>
+            </a:r>
+          </a:p>
+          <a:p>
+            <a:r>
+              <a:rPr lang="en-US" dirty="0"/>
+              <a:t>Configure management</a:t>
+            </a:r>
+          </a:p>
+          <a:p>
+            <a:r>
+              <a:rPr lang="en-US" dirty="0"/>
+              <a:t>Start worker by client </a:t>
             </a:r>
             <a:r>
               <a:rPr lang="en-US" dirty="0" err="1"/>
-              <a:t>crms</a:t>
-            </a:r>
-            <a:r>
-              <a:rPr lang="en-US" dirty="0"/>
-              <a:t>/master” success</a:t>
-            </a:r>
-          </a:p>
-          <a:p>
-            <a:pPr lvl="1"/>
-            <a:r>
-              <a:rPr lang="en-US" dirty="0"/>
-              <a:t>The node value is the master name</a:t>
-            </a:r>
-          </a:p>
-          <a:p>
-            <a:pPr lvl="1"/>
-            <a:r>
-              <a:rPr lang="en-US" dirty="0"/>
-              <a:t>Winner:</a:t>
-            </a:r>
-          </a:p>
-          <a:p>
-            <a:pPr lvl="2"/>
-            <a:r>
-              <a:rPr lang="en-US" dirty="0"/>
-              <a:t>Node life extension</a:t>
-            </a:r>
-          </a:p>
-          <a:p>
-            <a:pPr lvl="1"/>
-            <a:r>
-              <a:rPr lang="en-US" dirty="0"/>
-              <a:t>Loser:</a:t>
-            </a:r>
-          </a:p>
-          <a:p>
-            <a:pPr lvl="2"/>
-            <a:r>
-              <a:rPr lang="en-US" dirty="0"/>
-              <a:t>Watch node “</a:t>
-            </a:r>
-            <a:r>
-              <a:rPr lang="en-US" dirty="0" err="1"/>
-              <a:t>crms</a:t>
-            </a:r>
-            <a:r>
-              <a:rPr lang="en-US" dirty="0"/>
-              <a:t>/master”, if deleted, election again</a:t>
-            </a:r>
-          </a:p>
-          <a:p>
-            <a:pPr lvl="1"/>
+              <a:t>api</a:t>
+            </a:r>
             <a:endParaRPr lang="en-US" dirty="0"/>
           </a:p>
           <a:p>
-            <a:pPr marL="0" indent="0">
-              <a:buNone/>
-            </a:pPr>
-            <a:endParaRPr lang="en-US" dirty="0"/>
-          </a:p>
-        </p:txBody>
-      </p:sp>
-      <p:sp>
-        <p:nvSpPr>
-          <p:cNvPr id="4" name="Oval 3">
-            <a:extLst>
-              <a:ext uri="{FF2B5EF4-FFF2-40B4-BE49-F238E27FC236}">
-                <a16:creationId xmlns:a16="http://schemas.microsoft.com/office/drawing/2014/main" id="{FEEBDE4D-709F-4A1F-BB3B-7E31489233E8}"/>
-              </a:ext>
-            </a:extLst>
-          </p:cNvPr>
-          <p:cNvSpPr/>
-          <p:nvPr/>
-        </p:nvSpPr>
-        <p:spPr>
-          <a:xfrm>
-            <a:off x="7198466" y="365125"/>
-            <a:ext cx="1215959" cy="757454"/>
-          </a:xfrm>
-          <a:prstGeom prst="ellipse">
-            <a:avLst/>
-          </a:prstGeom>
-        </p:spPr>
-        <p:style>
-          <a:lnRef idx="2">
-            <a:schemeClr val="accent1">
-              <a:shade val="50000"/>
-            </a:schemeClr>
-          </a:lnRef>
-          <a:fillRef idx="1">
-            <a:schemeClr val="accent1"/>
-          </a:fillRef>
-          <a:effectRef idx="0">
-            <a:schemeClr val="accent1"/>
-          </a:effectRef>
-          <a:fontRef idx="minor">
-            <a:schemeClr val="lt1"/>
-          </a:fontRef>
-        </p:style>
-        <p:txBody>
-          <a:bodyPr rtlCol="0" anchor="ctr"/>
-          <a:lstStyle/>
-          <a:p>
-            <a:pPr algn="ctr"/>
-            <a:r>
-              <a:rPr lang="en-US" dirty="0"/>
-              <a:t>master</a:t>
-            </a:r>
-          </a:p>
-          <a:p>
-            <a:pPr algn="ctr"/>
-            <a:r>
-              <a:rPr lang="en-US" dirty="0" err="1"/>
-              <a:t>weliu</a:t>
-            </a:r>
-            <a:endParaRPr lang="en-US" dirty="0"/>
-          </a:p>
-        </p:txBody>
-      </p:sp>
-      <p:sp>
-        <p:nvSpPr>
-          <p:cNvPr id="5" name="Oval 4">
-            <a:extLst>
-              <a:ext uri="{FF2B5EF4-FFF2-40B4-BE49-F238E27FC236}">
-                <a16:creationId xmlns:a16="http://schemas.microsoft.com/office/drawing/2014/main" id="{7B1ABECB-9604-4B25-8480-E150B550E208}"/>
-              </a:ext>
-            </a:extLst>
-          </p:cNvPr>
-          <p:cNvSpPr/>
-          <p:nvPr/>
-        </p:nvSpPr>
-        <p:spPr>
-          <a:xfrm>
-            <a:off x="7217922" y="1622591"/>
-            <a:ext cx="1293778" cy="768513"/>
-          </a:xfrm>
-          <a:prstGeom prst="ellipse">
-            <a:avLst/>
-          </a:prstGeom>
-        </p:spPr>
-        <p:style>
-          <a:lnRef idx="2">
-            <a:schemeClr val="accent1">
-              <a:shade val="50000"/>
-            </a:schemeClr>
-          </a:lnRef>
-          <a:fillRef idx="1">
-            <a:schemeClr val="accent1"/>
-          </a:fillRef>
-          <a:effectRef idx="0">
-            <a:schemeClr val="accent1"/>
-          </a:effectRef>
-          <a:fontRef idx="minor">
-            <a:schemeClr val="lt1"/>
-          </a:fontRef>
-        </p:style>
-        <p:txBody>
-          <a:bodyPr rtlCol="0" anchor="ctr"/>
-          <a:lstStyle/>
-          <a:p>
-            <a:pPr algn="ctr"/>
-            <a:r>
-              <a:rPr lang="en-US" dirty="0"/>
-              <a:t>master </a:t>
-            </a:r>
-            <a:r>
-              <a:rPr lang="en-US" dirty="0" err="1"/>
-              <a:t>wenzhe</a:t>
-            </a:r>
-            <a:endParaRPr lang="en-US" dirty="0"/>
-          </a:p>
-        </p:txBody>
-      </p:sp>
-      <p:sp>
-        <p:nvSpPr>
-          <p:cNvPr id="6" name="Rectangle 5">
-            <a:extLst>
-              <a:ext uri="{FF2B5EF4-FFF2-40B4-BE49-F238E27FC236}">
-                <a16:creationId xmlns:a16="http://schemas.microsoft.com/office/drawing/2014/main" id="{1B48C1E6-ED57-4919-A20D-CDAF4815D1EB}"/>
-              </a:ext>
-            </a:extLst>
-          </p:cNvPr>
-          <p:cNvSpPr/>
-          <p:nvPr/>
-        </p:nvSpPr>
-        <p:spPr>
-          <a:xfrm>
-            <a:off x="9523379" y="891171"/>
-            <a:ext cx="1731523" cy="1105028"/>
-          </a:xfrm>
-          <a:prstGeom prst="rect">
-            <a:avLst/>
-          </a:prstGeom>
-        </p:spPr>
-        <p:style>
-          <a:lnRef idx="2">
-            <a:schemeClr val="accent1">
-              <a:shade val="50000"/>
-            </a:schemeClr>
-          </a:lnRef>
-          <a:fillRef idx="1">
-            <a:schemeClr val="accent1"/>
-          </a:fillRef>
-          <a:effectRef idx="0">
-            <a:schemeClr val="accent1"/>
-          </a:effectRef>
-          <a:fontRef idx="minor">
-            <a:schemeClr val="lt1"/>
-          </a:fontRef>
-        </p:style>
-        <p:txBody>
-          <a:bodyPr rtlCol="0" anchor="ctr"/>
-          <a:lstStyle/>
-          <a:p>
-            <a:pPr algn="ctr"/>
-            <a:r>
-              <a:rPr lang="en-US" dirty="0" err="1"/>
-              <a:t>crms</a:t>
-            </a:r>
-            <a:r>
-              <a:rPr lang="en-US" dirty="0"/>
-              <a:t>/master</a:t>
-            </a:r>
-          </a:p>
-          <a:p>
-            <a:pPr algn="ctr"/>
-            <a:r>
-              <a:rPr lang="en-US" dirty="0" err="1"/>
-              <a:t>wenzhe</a:t>
-            </a:r>
-            <a:endParaRPr lang="en-US" dirty="0"/>
-          </a:p>
-        </p:txBody>
-      </p:sp>
-      <p:cxnSp>
-        <p:nvCxnSpPr>
-          <p:cNvPr id="8" name="Straight Arrow Connector 7">
-            <a:extLst>
-              <a:ext uri="{FF2B5EF4-FFF2-40B4-BE49-F238E27FC236}">
-                <a16:creationId xmlns:a16="http://schemas.microsoft.com/office/drawing/2014/main" id="{62CF3576-74CD-446E-B7CB-A7D32B0F3485}"/>
-              </a:ext>
-            </a:extLst>
-          </p:cNvPr>
-          <p:cNvCxnSpPr/>
-          <p:nvPr/>
-        </p:nvCxnSpPr>
-        <p:spPr>
-          <a:xfrm>
-            <a:off x="8492244" y="875489"/>
-            <a:ext cx="865765" cy="525294"/>
-          </a:xfrm>
-          <a:prstGeom prst="straightConnector1">
-            <a:avLst/>
-          </a:prstGeom>
-          <a:ln>
-            <a:tailEnd type="triangle"/>
-          </a:ln>
-        </p:spPr>
-        <p:style>
-          <a:lnRef idx="1">
-            <a:schemeClr val="accent1"/>
-          </a:lnRef>
-          <a:fillRef idx="0">
-            <a:schemeClr val="accent1"/>
-          </a:fillRef>
-          <a:effectRef idx="0">
-            <a:schemeClr val="accent1"/>
-          </a:effectRef>
-          <a:fontRef idx="minor">
-            <a:schemeClr val="tx1"/>
-          </a:fontRef>
-        </p:style>
-      </p:cxnSp>
-      <p:cxnSp>
-        <p:nvCxnSpPr>
-          <p:cNvPr id="10" name="Straight Arrow Connector 9">
-            <a:extLst>
-              <a:ext uri="{FF2B5EF4-FFF2-40B4-BE49-F238E27FC236}">
-                <a16:creationId xmlns:a16="http://schemas.microsoft.com/office/drawing/2014/main" id="{32DDB3BF-EF89-425E-9084-D9B84F92CD81}"/>
-              </a:ext>
-            </a:extLst>
-          </p:cNvPr>
-          <p:cNvCxnSpPr/>
-          <p:nvPr/>
-        </p:nvCxnSpPr>
-        <p:spPr>
-          <a:xfrm flipV="1">
-            <a:off x="8574929" y="1544801"/>
-            <a:ext cx="849552" cy="568109"/>
-          </a:xfrm>
-          <a:prstGeom prst="straightConnector1">
-            <a:avLst/>
-          </a:prstGeom>
-          <a:ln>
-            <a:tailEnd type="triangle"/>
-          </a:ln>
-        </p:spPr>
-        <p:style>
-          <a:lnRef idx="1">
-            <a:schemeClr val="accent1"/>
-          </a:lnRef>
-          <a:fillRef idx="0">
-            <a:schemeClr val="accent1"/>
-          </a:fillRef>
-          <a:effectRef idx="0">
-            <a:schemeClr val="accent1"/>
-          </a:effectRef>
-          <a:fontRef idx="minor">
-            <a:schemeClr val="tx1"/>
-          </a:fontRef>
-        </p:style>
-      </p:cxnSp>
-      <p:sp>
-        <p:nvSpPr>
-          <p:cNvPr id="11" name="TextBox 10">
-            <a:extLst>
-              <a:ext uri="{FF2B5EF4-FFF2-40B4-BE49-F238E27FC236}">
-                <a16:creationId xmlns:a16="http://schemas.microsoft.com/office/drawing/2014/main" id="{D391BC1F-2234-4EF1-80A4-82F8276E4F56}"/>
-              </a:ext>
-            </a:extLst>
-          </p:cNvPr>
-          <p:cNvSpPr txBox="1"/>
-          <p:nvPr/>
-        </p:nvSpPr>
-        <p:spPr>
-          <a:xfrm>
-            <a:off x="8757301" y="1928244"/>
-            <a:ext cx="524503" cy="369332"/>
-          </a:xfrm>
-          <a:prstGeom prst="rect">
-            <a:avLst/>
-          </a:prstGeom>
-          <a:noFill/>
-        </p:spPr>
-        <p:txBody>
-          <a:bodyPr wrap="none" rtlCol="0">
-            <a:spAutoFit/>
-          </a:bodyPr>
-          <a:lstStyle/>
-          <a:p>
-            <a:r>
-              <a:rPr lang="en-US" dirty="0"/>
-              <a:t>win</a:t>
-            </a:r>
-          </a:p>
-        </p:txBody>
-      </p:sp>
-      <p:sp>
-        <p:nvSpPr>
-          <p:cNvPr id="12" name="TextBox 11">
-            <a:extLst>
-              <a:ext uri="{FF2B5EF4-FFF2-40B4-BE49-F238E27FC236}">
-                <a16:creationId xmlns:a16="http://schemas.microsoft.com/office/drawing/2014/main" id="{5AE6A824-CFB6-44AF-AD85-25CA15F2129F}"/>
-              </a:ext>
-            </a:extLst>
-          </p:cNvPr>
-          <p:cNvSpPr txBox="1"/>
-          <p:nvPr/>
-        </p:nvSpPr>
-        <p:spPr>
-          <a:xfrm>
-            <a:off x="8642837" y="658574"/>
-            <a:ext cx="564578" cy="369332"/>
-          </a:xfrm>
-          <a:prstGeom prst="rect">
-            <a:avLst/>
-          </a:prstGeom>
-          <a:noFill/>
-        </p:spPr>
-        <p:txBody>
-          <a:bodyPr wrap="none" rtlCol="0">
-            <a:spAutoFit/>
-          </a:bodyPr>
-          <a:lstStyle/>
-          <a:p>
-            <a:r>
-              <a:rPr lang="en-US" dirty="0"/>
-              <a:t>lose</a:t>
+            <a:r>
+              <a:rPr lang="en-US" dirty="0"/>
+              <a:t>Kill job</a:t>
+            </a:r>
+          </a:p>
+          <a:p>
+            <a:r>
+              <a:rPr lang="en-US" dirty="0"/>
+              <a:t>Job group</a:t>
             </a:r>
           </a:p>
         </p:txBody>
@@ -4588,7 +4330,7 @@
     </p:spTree>
     <p:extLst>
       <p:ext uri="{BB962C8B-B14F-4D97-AF65-F5344CB8AC3E}">
-        <p14:creationId xmlns:p14="http://schemas.microsoft.com/office/powerpoint/2010/main" val="3980687860"/>
+        <p14:creationId xmlns:p14="http://schemas.microsoft.com/office/powerpoint/2010/main" val="3018931163"/>
       </p:ext>
     </p:extLst>
   </p:cSld>
@@ -4620,7 +4362,7 @@
           <p:cNvPr id="2" name="Title 1">
             <a:extLst>
               <a:ext uri="{FF2B5EF4-FFF2-40B4-BE49-F238E27FC236}">
-                <a16:creationId xmlns:a16="http://schemas.microsoft.com/office/drawing/2014/main" id="{0C5946EC-8FD6-4715-AB82-CEF9D32F2FA7}"/>
+                <a16:creationId xmlns:a16="http://schemas.microsoft.com/office/drawing/2014/main" id="{A5EE06EA-1EC6-4313-9D46-428B6BFAE98E}"/>
               </a:ext>
             </a:extLst>
           </p:cNvPr>
@@ -4638,7 +4380,7 @@
           <a:p>
             <a:r>
               <a:rPr lang="en-US" dirty="0"/>
-              <a:t>Load balance</a:t>
+              <a:t>Master</a:t>
             </a:r>
           </a:p>
         </p:txBody>
@@ -4648,7 +4390,7 @@
           <p:cNvPr id="3" name="Content Placeholder 2">
             <a:extLst>
               <a:ext uri="{FF2B5EF4-FFF2-40B4-BE49-F238E27FC236}">
-                <a16:creationId xmlns:a16="http://schemas.microsoft.com/office/drawing/2014/main" id="{05152C54-ED93-404F-9D18-D9D5C9326A35}"/>
+                <a16:creationId xmlns:a16="http://schemas.microsoft.com/office/drawing/2014/main" id="{1497D334-1906-4524-B07B-CAD0DB8DB480}"/>
               </a:ext>
             </a:extLst>
           </p:cNvPr>
@@ -4659,39 +4401,91 @@
             <p:ph idx="1"/>
           </p:nvPr>
         </p:nvSpPr>
-        <p:spPr/>
-        <p:txBody>
-          <a:bodyPr/>
-          <a:lstStyle/>
-          <a:p>
-            <a:r>
-              <a:rPr lang="en-US" dirty="0"/>
-              <a:t>Each worker register its workload info to </a:t>
+        <p:spPr>
+          <a:xfrm>
+            <a:off x="526915" y="2334717"/>
+            <a:ext cx="10515600" cy="3917415"/>
+          </a:xfrm>
+        </p:spPr>
+        <p:txBody>
+          <a:bodyPr>
+            <a:normAutofit/>
+          </a:bodyPr>
+          <a:lstStyle/>
+          <a:p>
+            <a:r>
+              <a:rPr lang="en-US" dirty="0"/>
+              <a:t>Leader election</a:t>
+            </a:r>
+          </a:p>
+          <a:p>
+            <a:pPr lvl="1"/>
+            <a:r>
+              <a:rPr lang="en-US" dirty="0"/>
+              <a:t>The first one write the temp node “</a:t>
             </a:r>
             <a:r>
               <a:rPr lang="en-US" dirty="0" err="1"/>
-              <a:t>etcd</a:t>
-            </a:r>
-            <a:r>
-              <a:rPr lang="en-US" dirty="0"/>
-              <a:t> periodically</a:t>
-            </a:r>
-          </a:p>
-          <a:p>
-            <a:r>
-              <a:rPr lang="en-US" dirty="0"/>
-              <a:t>Master watched the workload info select the most idle worker</a:t>
-            </a:r>
-          </a:p>
-          <a:p>
-            <a:r>
-              <a:rPr lang="en-US" dirty="0"/>
-              <a:t>When run job, if not specify worker, assign to the most idle worker</a:t>
-            </a:r>
-          </a:p>
-          <a:p>
+              <a:t>crms</a:t>
+            </a:r>
+            <a:r>
+              <a:rPr lang="en-US" dirty="0"/>
+              <a:t>/master” success</a:t>
+            </a:r>
+          </a:p>
+          <a:p>
+            <a:pPr lvl="1"/>
+            <a:r>
+              <a:rPr lang="en-US" dirty="0"/>
+              <a:t>The node value is the master name</a:t>
+            </a:r>
+          </a:p>
+          <a:p>
+            <a:pPr lvl="1"/>
+            <a:r>
+              <a:rPr lang="en-US" dirty="0"/>
+              <a:t>Winner:</a:t>
+            </a:r>
+          </a:p>
+          <a:p>
+            <a:pPr lvl="2"/>
+            <a:r>
+              <a:rPr lang="en-US" dirty="0"/>
+              <a:t>Node life extension</a:t>
+            </a:r>
+          </a:p>
+          <a:p>
+            <a:pPr lvl="1"/>
+            <a:r>
+              <a:rPr lang="en-US" dirty="0"/>
+              <a:t>Loser:</a:t>
+            </a:r>
+          </a:p>
+          <a:p>
+            <a:pPr lvl="2"/>
+            <a:r>
+              <a:rPr lang="en-US" dirty="0"/>
+              <a:t>Watch node “</a:t>
+            </a:r>
+            <a:r>
+              <a:rPr lang="en-US" dirty="0" err="1"/>
+              <a:t>crms</a:t>
+            </a:r>
+            <a:r>
+              <a:rPr lang="en-US" dirty="0"/>
+              <a:t>/master”, if deleted, election again</a:t>
+            </a:r>
+          </a:p>
+          <a:p>
+            <a:pPr lvl="1"/>
             <a:endParaRPr lang="en-US" dirty="0"/>
           </a:p>
+          <a:p>
+            <a:pPr marL="0" indent="0">
+              <a:buNone/>
+            </a:pPr>
+            <a:endParaRPr lang="en-US" dirty="0"/>
+          </a:p>
         </p:txBody>
       </p:sp>
       <p:sp>
@@ -4699,7 +4493,7 @@
           <p:cNvPr id="4" name="Oval 3">
             <a:extLst>
               <a:ext uri="{FF2B5EF4-FFF2-40B4-BE49-F238E27FC236}">
-                <a16:creationId xmlns:a16="http://schemas.microsoft.com/office/drawing/2014/main" id="{05851DB7-1B70-4FF6-807F-78B53BD7C874}"/>
+                <a16:creationId xmlns:a16="http://schemas.microsoft.com/office/drawing/2014/main" id="{FEEBDE4D-709F-4A1F-BB3B-7E31489233E8}"/>
               </a:ext>
             </a:extLst>
           </p:cNvPr>
@@ -4708,7 +4502,7 @@
         </p:nvSpPr>
         <p:spPr>
           <a:xfrm>
-            <a:off x="1524806" y="3692212"/>
+            <a:off x="7198466" y="365125"/>
             <a:ext cx="1215959" cy="757454"/>
           </a:xfrm>
           <a:prstGeom prst="ellipse">
@@ -4738,7 +4532,7 @@
             <a:pPr algn="ctr"/>
             <a:r>
               <a:rPr lang="en-US" dirty="0"/>
-              <a:t>worker</a:t>
+              <a:t>master</a:t>
             </a:r>
           </a:p>
           <a:p>
@@ -4756,7 +4550,7 @@
           <p:cNvPr id="5" name="Oval 4">
             <a:extLst>
               <a:ext uri="{FF2B5EF4-FFF2-40B4-BE49-F238E27FC236}">
-                <a16:creationId xmlns:a16="http://schemas.microsoft.com/office/drawing/2014/main" id="{FFBD6D44-8A49-42B2-9D85-04107BC54A40}"/>
+                <a16:creationId xmlns:a16="http://schemas.microsoft.com/office/drawing/2014/main" id="{7B1ABECB-9604-4B25-8480-E150B550E208}"/>
               </a:ext>
             </a:extLst>
           </p:cNvPr>
@@ -4765,7 +4559,7 @@
         </p:nvSpPr>
         <p:spPr>
           <a:xfrm>
-            <a:off x="1524808" y="5732438"/>
+            <a:off x="7217922" y="1622591"/>
             <a:ext cx="1293778" cy="768513"/>
           </a:xfrm>
           <a:prstGeom prst="ellipse">
@@ -4795,7 +4589,7 @@
             <a:pPr algn="ctr"/>
             <a:r>
               <a:rPr lang="en-US" dirty="0"/>
-              <a:t>worker </a:t>
+              <a:t>master </a:t>
             </a:r>
             <a:r>
               <a:rPr lang="en-US" dirty="0" err="1"/>
@@ -4810,7 +4604,7 @@
           <p:cNvPr id="6" name="Rectangle 5">
             <a:extLst>
               <a:ext uri="{FF2B5EF4-FFF2-40B4-BE49-F238E27FC236}">
-                <a16:creationId xmlns:a16="http://schemas.microsoft.com/office/drawing/2014/main" id="{1FAD72E8-3029-493D-B2ED-73F072CAF29B}"/>
+                <a16:creationId xmlns:a16="http://schemas.microsoft.com/office/drawing/2014/main" id="{1B48C1E6-ED57-4919-A20D-CDAF4815D1EB}"/>
               </a:ext>
             </a:extLst>
           </p:cNvPr>
@@ -4819,8 +4613,8 @@
         </p:nvSpPr>
         <p:spPr>
           <a:xfrm>
-            <a:off x="3986717" y="3775491"/>
-            <a:ext cx="2491904" cy="590895"/>
+            <a:off x="9523379" y="891171"/>
+            <a:ext cx="1731523" cy="1105028"/>
           </a:xfrm>
           <a:prstGeom prst="rect">
             <a:avLst/>
@@ -4853,156 +4647,74 @@
             </a:r>
             <a:r>
               <a:rPr lang="en-US" dirty="0"/>
-              <a:t>/workload/</a:t>
-            </a:r>
-            <a:r>
-              <a:rPr lang="en-US" dirty="0" err="1"/>
-              <a:t>weliu</a:t>
-            </a:r>
-            <a:endParaRPr lang="en-US" dirty="0"/>
+              <a:t>/master</a:t>
+            </a:r>
           </a:p>
           <a:p>
             <a:pPr algn="ctr"/>
-            <a:r>
-              <a:rPr lang="en-US" dirty="0"/>
-              <a:t>Workload info</a:t>
-            </a:r>
-          </a:p>
-        </p:txBody>
-      </p:sp>
-      <p:sp>
-        <p:nvSpPr>
-          <p:cNvPr id="7" name="Rectangle 6">
-            <a:extLst>
-              <a:ext uri="{FF2B5EF4-FFF2-40B4-BE49-F238E27FC236}">
-                <a16:creationId xmlns:a16="http://schemas.microsoft.com/office/drawing/2014/main" id="{76083FD9-F604-4AE8-A28C-F16ACD4E8919}"/>
-              </a:ext>
-            </a:extLst>
-          </p:cNvPr>
-          <p:cNvSpPr/>
-          <p:nvPr/>
-        </p:nvSpPr>
-        <p:spPr>
-          <a:xfrm>
-            <a:off x="4064538" y="5839555"/>
-            <a:ext cx="2491904" cy="554280"/>
-          </a:xfrm>
-          <a:prstGeom prst="rect">
-            <a:avLst/>
-          </a:prstGeom>
-        </p:spPr>
-        <p:style>
-          <a:lnRef idx="2">
-            <a:schemeClr val="accent1">
-              <a:shade val="50000"/>
-            </a:schemeClr>
-          </a:lnRef>
-          <a:fillRef idx="1">
-            <a:schemeClr val="accent1"/>
-          </a:fillRef>
-          <a:effectRef idx="0">
-            <a:schemeClr val="accent1"/>
-          </a:effectRef>
-          <a:fontRef idx="minor">
-            <a:schemeClr val="lt1"/>
-          </a:fontRef>
-        </p:style>
-        <p:txBody>
-          <a:bodyPr rtlCol="0" anchor="ctr"/>
-          <a:lstStyle/>
-          <a:p>
-            <a:pPr algn="ctr"/>
-            <a:r>
-              <a:rPr lang="en-US" dirty="0" err="1"/>
-              <a:t>crms</a:t>
-            </a:r>
-            <a:r>
-              <a:rPr lang="en-US" dirty="0"/>
-              <a:t>/workload/</a:t>
-            </a:r>
             <a:r>
               <a:rPr lang="en-US" dirty="0" err="1"/>
               <a:t>wenzhe</a:t>
             </a:r>
             <a:endParaRPr lang="en-US" dirty="0"/>
           </a:p>
-          <a:p>
-            <a:pPr algn="ctr"/>
-            <a:r>
-              <a:rPr lang="en-US" dirty="0"/>
-              <a:t>Workload info</a:t>
-            </a:r>
-          </a:p>
-        </p:txBody>
-      </p:sp>
-      <p:sp>
-        <p:nvSpPr>
-          <p:cNvPr id="8" name="Oval 7">
-            <a:extLst>
-              <a:ext uri="{FF2B5EF4-FFF2-40B4-BE49-F238E27FC236}">
-                <a16:creationId xmlns:a16="http://schemas.microsoft.com/office/drawing/2014/main" id="{8EEE84CD-E184-4CD0-A5B5-394363395ED9}"/>
-              </a:ext>
-            </a:extLst>
-          </p:cNvPr>
-          <p:cNvSpPr/>
-          <p:nvPr/>
-        </p:nvSpPr>
-        <p:spPr>
-          <a:xfrm>
-            <a:off x="8009106" y="4693481"/>
-            <a:ext cx="1293778" cy="768513"/>
-          </a:xfrm>
-          <a:prstGeom prst="ellipse">
-            <a:avLst/>
-          </a:prstGeom>
-        </p:spPr>
-        <p:style>
-          <a:lnRef idx="2">
-            <a:schemeClr val="accent1">
-              <a:shade val="50000"/>
-            </a:schemeClr>
-          </a:lnRef>
-          <a:fillRef idx="1">
-            <a:schemeClr val="accent1"/>
-          </a:fillRef>
-          <a:effectRef idx="0">
-            <a:schemeClr val="accent1"/>
-          </a:effectRef>
-          <a:fontRef idx="minor">
-            <a:schemeClr val="lt1"/>
-          </a:fontRef>
-        </p:style>
-        <p:txBody>
-          <a:bodyPr rtlCol="0" anchor="ctr"/>
-          <a:lstStyle/>
-          <a:p>
-            <a:pPr algn="ctr"/>
-            <a:r>
-              <a:rPr lang="en-US" dirty="0"/>
-              <a:t>master leader</a:t>
-            </a:r>
-          </a:p>
-        </p:txBody>
-      </p:sp>
+        </p:txBody>
+      </p:sp>
+      <p:cxnSp>
+        <p:nvCxnSpPr>
+          <p:cNvPr id="8" name="Straight Arrow Connector 7">
+            <a:extLst>
+              <a:ext uri="{FF2B5EF4-FFF2-40B4-BE49-F238E27FC236}">
+                <a16:creationId xmlns:a16="http://schemas.microsoft.com/office/drawing/2014/main" id="{62CF3576-74CD-446E-B7CB-A7D32B0F3485}"/>
+              </a:ext>
+            </a:extLst>
+          </p:cNvPr>
+          <p:cNvCxnSpPr/>
+          <p:nvPr/>
+        </p:nvCxnSpPr>
+        <p:spPr>
+          <a:xfrm>
+            <a:off x="8492244" y="875489"/>
+            <a:ext cx="865765" cy="525294"/>
+          </a:xfrm>
+          <a:prstGeom prst="straightConnector1">
+            <a:avLst/>
+          </a:prstGeom>
+          <a:ln>
+            <a:tailEnd type="triangle"/>
+          </a:ln>
+        </p:spPr>
+        <p:style>
+          <a:lnRef idx="1">
+            <a:schemeClr val="accent1"/>
+          </a:lnRef>
+          <a:fillRef idx="0">
+            <a:schemeClr val="accent1"/>
+          </a:fillRef>
+          <a:effectRef idx="0">
+            <a:schemeClr val="accent1"/>
+          </a:effectRef>
+          <a:fontRef idx="minor">
+            <a:schemeClr val="tx1"/>
+          </a:fontRef>
+        </p:style>
+      </p:cxnSp>
       <p:cxnSp>
         <p:nvCxnSpPr>
           <p:cNvPr id="10" name="Straight Arrow Connector 9">
             <a:extLst>
               <a:ext uri="{FF2B5EF4-FFF2-40B4-BE49-F238E27FC236}">
-                <a16:creationId xmlns:a16="http://schemas.microsoft.com/office/drawing/2014/main" id="{C54C8FFE-5EF8-4502-9CD0-AEE0A9D3BAE3}"/>
-              </a:ext>
-            </a:extLst>
-          </p:cNvPr>
-          <p:cNvCxnSpPr>
-            <a:stCxn id="4" idx="6"/>
-            <a:endCxn id="6" idx="1"/>
-          </p:cNvCxnSpPr>
+                <a16:creationId xmlns:a16="http://schemas.microsoft.com/office/drawing/2014/main" id="{32DDB3BF-EF89-425E-9084-D9B84F92CD81}"/>
+              </a:ext>
+            </a:extLst>
+          </p:cNvPr>
+          <p:cNvCxnSpPr/>
           <p:nvPr/>
         </p:nvCxnSpPr>
         <p:spPr>
-          <a:xfrm>
-            <a:off x="2740765" y="4070939"/>
-            <a:ext cx="1245952" cy="0"/>
+          <a:xfrm flipV="1">
+            <a:off x="8574929" y="1544801"/>
+            <a:ext cx="849552" cy="568109"/>
           </a:xfrm>
           <a:prstGeom prst="straightConnector1">
             <a:avLst/>
@@ -5026,241 +4738,12 @@
           </a:fontRef>
         </p:style>
       </p:cxnSp>
-      <p:cxnSp>
-        <p:nvCxnSpPr>
-          <p:cNvPr id="12" name="Straight Arrow Connector 11">
-            <a:extLst>
-              <a:ext uri="{FF2B5EF4-FFF2-40B4-BE49-F238E27FC236}">
-                <a16:creationId xmlns:a16="http://schemas.microsoft.com/office/drawing/2014/main" id="{365F017F-229B-4AB7-B97B-124D22202BB8}"/>
-              </a:ext>
-            </a:extLst>
-          </p:cNvPr>
-          <p:cNvCxnSpPr>
-            <a:stCxn id="5" idx="6"/>
-            <a:endCxn id="7" idx="1"/>
-          </p:cNvCxnSpPr>
-          <p:nvPr/>
-        </p:nvCxnSpPr>
-        <p:spPr>
-          <a:xfrm>
-            <a:off x="2818586" y="6116695"/>
-            <a:ext cx="1245952" cy="0"/>
-          </a:xfrm>
-          <a:prstGeom prst="straightConnector1">
-            <a:avLst/>
-          </a:prstGeom>
-          <a:ln>
-            <a:tailEnd type="triangle"/>
-          </a:ln>
-        </p:spPr>
-        <p:style>
-          <a:lnRef idx="1">
-            <a:schemeClr val="accent1"/>
-          </a:lnRef>
-          <a:fillRef idx="0">
-            <a:schemeClr val="accent1"/>
-          </a:fillRef>
-          <a:effectRef idx="0">
-            <a:schemeClr val="accent1"/>
-          </a:effectRef>
-          <a:fontRef idx="minor">
-            <a:schemeClr val="tx1"/>
-          </a:fontRef>
-        </p:style>
-      </p:cxnSp>
-      <p:cxnSp>
-        <p:nvCxnSpPr>
-          <p:cNvPr id="14" name="Straight Arrow Connector 13">
-            <a:extLst>
-              <a:ext uri="{FF2B5EF4-FFF2-40B4-BE49-F238E27FC236}">
-                <a16:creationId xmlns:a16="http://schemas.microsoft.com/office/drawing/2014/main" id="{55BDD150-E550-457C-9E04-30A424595B43}"/>
-              </a:ext>
-            </a:extLst>
-          </p:cNvPr>
-          <p:cNvCxnSpPr>
-            <a:stCxn id="6" idx="3"/>
-            <a:endCxn id="8" idx="1"/>
-          </p:cNvCxnSpPr>
-          <p:nvPr/>
-        </p:nvCxnSpPr>
-        <p:spPr>
-          <a:xfrm>
-            <a:off x="6478621" y="4070939"/>
-            <a:ext cx="1719954" cy="735088"/>
-          </a:xfrm>
-          <a:prstGeom prst="straightConnector1">
-            <a:avLst/>
-          </a:prstGeom>
-          <a:ln>
-            <a:tailEnd type="triangle"/>
-          </a:ln>
-        </p:spPr>
-        <p:style>
-          <a:lnRef idx="1">
-            <a:schemeClr val="accent1"/>
-          </a:lnRef>
-          <a:fillRef idx="0">
-            <a:schemeClr val="accent1"/>
-          </a:fillRef>
-          <a:effectRef idx="0">
-            <a:schemeClr val="accent1"/>
-          </a:effectRef>
-          <a:fontRef idx="minor">
-            <a:schemeClr val="tx1"/>
-          </a:fontRef>
-        </p:style>
-      </p:cxnSp>
-      <p:cxnSp>
-        <p:nvCxnSpPr>
-          <p:cNvPr id="16" name="Straight Arrow Connector 15">
-            <a:extLst>
-              <a:ext uri="{FF2B5EF4-FFF2-40B4-BE49-F238E27FC236}">
-                <a16:creationId xmlns:a16="http://schemas.microsoft.com/office/drawing/2014/main" id="{959ECF60-B0BF-49A5-BD18-557D265F89A2}"/>
-              </a:ext>
-            </a:extLst>
-          </p:cNvPr>
-          <p:cNvCxnSpPr>
-            <a:stCxn id="7" idx="3"/>
-            <a:endCxn id="8" idx="3"/>
-          </p:cNvCxnSpPr>
-          <p:nvPr/>
-        </p:nvCxnSpPr>
-        <p:spPr>
-          <a:xfrm flipV="1">
-            <a:off x="6556442" y="5349448"/>
-            <a:ext cx="1642133" cy="767247"/>
-          </a:xfrm>
-          <a:prstGeom prst="straightConnector1">
-            <a:avLst/>
-          </a:prstGeom>
-          <a:ln>
-            <a:tailEnd type="triangle"/>
-          </a:ln>
-        </p:spPr>
-        <p:style>
-          <a:lnRef idx="1">
-            <a:schemeClr val="accent1"/>
-          </a:lnRef>
-          <a:fillRef idx="0">
-            <a:schemeClr val="accent1"/>
-          </a:fillRef>
-          <a:effectRef idx="0">
-            <a:schemeClr val="accent1"/>
-          </a:effectRef>
-          <a:fontRef idx="minor">
-            <a:schemeClr val="tx1"/>
-          </a:fontRef>
-        </p:style>
-      </p:cxnSp>
-      <p:sp>
-        <p:nvSpPr>
-          <p:cNvPr id="21" name="Rectangle 20">
-            <a:extLst>
-              <a:ext uri="{FF2B5EF4-FFF2-40B4-BE49-F238E27FC236}">
-                <a16:creationId xmlns:a16="http://schemas.microsoft.com/office/drawing/2014/main" id="{FC05C6AD-26CE-492D-BD08-B9FFCC115E98}"/>
-              </a:ext>
-            </a:extLst>
-          </p:cNvPr>
-          <p:cNvSpPr/>
-          <p:nvPr/>
-        </p:nvSpPr>
-        <p:spPr>
-          <a:xfrm>
-            <a:off x="3986717" y="4782289"/>
-            <a:ext cx="2491904" cy="590895"/>
-          </a:xfrm>
-          <a:prstGeom prst="rect">
-            <a:avLst/>
-          </a:prstGeom>
-        </p:spPr>
-        <p:style>
-          <a:lnRef idx="2">
-            <a:schemeClr val="accent1">
-              <a:shade val="50000"/>
-            </a:schemeClr>
-          </a:lnRef>
-          <a:fillRef idx="1">
-            <a:schemeClr val="accent1"/>
-          </a:fillRef>
-          <a:effectRef idx="0">
-            <a:schemeClr val="accent1"/>
-          </a:effectRef>
-          <a:fontRef idx="minor">
-            <a:schemeClr val="lt1"/>
-          </a:fontRef>
-        </p:style>
-        <p:txBody>
-          <a:bodyPr rtlCol="0" anchor="ctr"/>
-          <a:lstStyle/>
-          <a:p>
-            <a:pPr algn="ctr"/>
-            <a:r>
-              <a:rPr lang="en-US" dirty="0" err="1"/>
-              <a:t>crms</a:t>
-            </a:r>
-            <a:r>
-              <a:rPr lang="en-US" dirty="0"/>
-              <a:t>/workload</a:t>
-            </a:r>
-          </a:p>
-          <a:p>
-            <a:pPr algn="ctr"/>
-            <a:r>
-              <a:rPr lang="en-US" dirty="0" err="1"/>
-              <a:t>wenzhe</a:t>
-            </a:r>
-            <a:endParaRPr lang="en-US" dirty="0"/>
-          </a:p>
-        </p:txBody>
-      </p:sp>
-      <p:cxnSp>
-        <p:nvCxnSpPr>
-          <p:cNvPr id="25" name="Straight Arrow Connector 24">
-            <a:extLst>
-              <a:ext uri="{FF2B5EF4-FFF2-40B4-BE49-F238E27FC236}">
-                <a16:creationId xmlns:a16="http://schemas.microsoft.com/office/drawing/2014/main" id="{B3453D6C-D317-41BF-BDAC-C8CECE143B7C}"/>
-              </a:ext>
-            </a:extLst>
-          </p:cNvPr>
-          <p:cNvCxnSpPr>
-            <a:stCxn id="8" idx="2"/>
-            <a:endCxn id="21" idx="3"/>
-          </p:cNvCxnSpPr>
-          <p:nvPr/>
-        </p:nvCxnSpPr>
-        <p:spPr>
-          <a:xfrm flipH="1" flipV="1">
-            <a:off x="6478621" y="5077737"/>
-            <a:ext cx="1530485" cy="1"/>
-          </a:xfrm>
-          <a:prstGeom prst="straightConnector1">
-            <a:avLst/>
-          </a:prstGeom>
-          <a:ln>
-            <a:tailEnd type="triangle"/>
-          </a:ln>
-        </p:spPr>
-        <p:style>
-          <a:lnRef idx="1">
-            <a:schemeClr val="accent1"/>
-          </a:lnRef>
-          <a:fillRef idx="0">
-            <a:schemeClr val="accent1"/>
-          </a:fillRef>
-          <a:effectRef idx="0">
-            <a:schemeClr val="accent1"/>
-          </a:effectRef>
-          <a:fontRef idx="minor">
-            <a:schemeClr val="tx1"/>
-          </a:fontRef>
-        </p:style>
-      </p:cxnSp>
-      <p:sp>
-        <p:nvSpPr>
-          <p:cNvPr id="26" name="TextBox 25">
-            <a:extLst>
-              <a:ext uri="{FF2B5EF4-FFF2-40B4-BE49-F238E27FC236}">
-                <a16:creationId xmlns:a16="http://schemas.microsoft.com/office/drawing/2014/main" id="{0C322D60-B456-4CD0-AD0C-81D320F4280B}"/>
+      <p:sp>
+        <p:nvSpPr>
+          <p:cNvPr id="11" name="TextBox 10">
+            <a:extLst>
+              <a:ext uri="{FF2B5EF4-FFF2-40B4-BE49-F238E27FC236}">
+                <a16:creationId xmlns:a16="http://schemas.microsoft.com/office/drawing/2014/main" id="{D391BC1F-2234-4EF1-80A4-82F8276E4F56}"/>
               </a:ext>
             </a:extLst>
           </p:cNvPr>
@@ -5269,8 +4752,8 @@
         </p:nvSpPr>
         <p:spPr>
           <a:xfrm>
-            <a:off x="7338598" y="4164564"/>
-            <a:ext cx="1299074" cy="369332"/>
+            <a:off x="8757301" y="1928244"/>
+            <a:ext cx="524503" cy="369332"/>
           </a:xfrm>
           <a:prstGeom prst="rect">
             <a:avLst/>
@@ -5285,17 +4768,17 @@
           <a:p>
             <a:r>
               <a:rPr lang="en-US" dirty="0"/>
-              <a:t>Watched by</a:t>
-            </a:r>
-          </a:p>
-        </p:txBody>
-      </p:sp>
-      <p:sp>
-        <p:nvSpPr>
-          <p:cNvPr id="27" name="TextBox 26">
-            <a:extLst>
-              <a:ext uri="{FF2B5EF4-FFF2-40B4-BE49-F238E27FC236}">
-                <a16:creationId xmlns:a16="http://schemas.microsoft.com/office/drawing/2014/main" id="{51131A28-34CF-4435-839B-FA380478BA1E}"/>
+              <a:t>win</a:t>
+            </a:r>
+          </a:p>
+        </p:txBody>
+      </p:sp>
+      <p:sp>
+        <p:nvSpPr>
+          <p:cNvPr id="12" name="TextBox 11">
+            <a:extLst>
+              <a:ext uri="{FF2B5EF4-FFF2-40B4-BE49-F238E27FC236}">
+                <a16:creationId xmlns:a16="http://schemas.microsoft.com/office/drawing/2014/main" id="{5AE6A824-CFB6-44AF-AD85-25CA15F2129F}"/>
               </a:ext>
             </a:extLst>
           </p:cNvPr>
@@ -5304,8 +4787,8 @@
         </p:nvSpPr>
         <p:spPr>
           <a:xfrm>
-            <a:off x="7243863" y="5837765"/>
-            <a:ext cx="1299074" cy="369332"/>
+            <a:off x="8642837" y="658574"/>
+            <a:ext cx="564578" cy="369332"/>
           </a:xfrm>
           <a:prstGeom prst="rect">
             <a:avLst/>
@@ -5320,112 +4803,7 @@
           <a:p>
             <a:r>
               <a:rPr lang="en-US" dirty="0"/>
-              <a:t>Watched by</a:t>
-            </a:r>
-          </a:p>
-        </p:txBody>
-      </p:sp>
-      <p:sp>
-        <p:nvSpPr>
-          <p:cNvPr id="28" name="TextBox 27">
-            <a:extLst>
-              <a:ext uri="{FF2B5EF4-FFF2-40B4-BE49-F238E27FC236}">
-                <a16:creationId xmlns:a16="http://schemas.microsoft.com/office/drawing/2014/main" id="{83129C3D-8AFE-4B04-B29D-77B9CB4646E0}"/>
-              </a:ext>
-            </a:extLst>
-          </p:cNvPr>
-          <p:cNvSpPr txBox="1"/>
-          <p:nvPr/>
-        </p:nvSpPr>
-        <p:spPr>
-          <a:xfrm>
-            <a:off x="3011141" y="3701606"/>
-            <a:ext cx="505267" cy="369332"/>
-          </a:xfrm>
-          <a:prstGeom prst="rect">
-            <a:avLst/>
-          </a:prstGeom>
-          <a:noFill/>
-        </p:spPr>
-        <p:txBody>
-          <a:bodyPr wrap="none" rtlCol="0">
-            <a:spAutoFit/>
-          </a:bodyPr>
-          <a:lstStyle/>
-          <a:p>
-            <a:r>
-              <a:rPr lang="en-US" dirty="0"/>
-              <a:t>put</a:t>
-            </a:r>
-          </a:p>
-        </p:txBody>
-      </p:sp>
-      <p:sp>
-        <p:nvSpPr>
-          <p:cNvPr id="29" name="TextBox 28">
-            <a:extLst>
-              <a:ext uri="{FF2B5EF4-FFF2-40B4-BE49-F238E27FC236}">
-                <a16:creationId xmlns:a16="http://schemas.microsoft.com/office/drawing/2014/main" id="{40216B23-38E0-400E-8F2E-FE5F5A230E20}"/>
-              </a:ext>
-            </a:extLst>
-          </p:cNvPr>
-          <p:cNvSpPr txBox="1"/>
-          <p:nvPr/>
-        </p:nvSpPr>
-        <p:spPr>
-          <a:xfrm>
-            <a:off x="3031692" y="5743062"/>
-            <a:ext cx="505267" cy="369332"/>
-          </a:xfrm>
-          <a:prstGeom prst="rect">
-            <a:avLst/>
-          </a:prstGeom>
-          <a:noFill/>
-        </p:spPr>
-        <p:txBody>
-          <a:bodyPr wrap="none" rtlCol="0">
-            <a:spAutoFit/>
-          </a:bodyPr>
-          <a:lstStyle/>
-          <a:p>
-            <a:r>
-              <a:rPr lang="en-US" dirty="0"/>
-              <a:t>put</a:t>
-            </a:r>
-          </a:p>
-        </p:txBody>
-      </p:sp>
-      <p:sp>
-        <p:nvSpPr>
-          <p:cNvPr id="30" name="TextBox 29">
-            <a:extLst>
-              <a:ext uri="{FF2B5EF4-FFF2-40B4-BE49-F238E27FC236}">
-                <a16:creationId xmlns:a16="http://schemas.microsoft.com/office/drawing/2014/main" id="{DD46242D-B793-45E1-B879-006710F06BFA}"/>
-              </a:ext>
-            </a:extLst>
-          </p:cNvPr>
-          <p:cNvSpPr txBox="1"/>
-          <p:nvPr/>
-        </p:nvSpPr>
-        <p:spPr>
-          <a:xfrm>
-            <a:off x="6991229" y="4701154"/>
-            <a:ext cx="505267" cy="369332"/>
-          </a:xfrm>
-          <a:prstGeom prst="rect">
-            <a:avLst/>
-          </a:prstGeom>
-          <a:noFill/>
-        </p:spPr>
-        <p:txBody>
-          <a:bodyPr wrap="none" rtlCol="0">
-            <a:spAutoFit/>
-          </a:bodyPr>
-          <a:lstStyle/>
-          <a:p>
-            <a:r>
-              <a:rPr lang="en-US" dirty="0"/>
-              <a:t>put</a:t>
+              <a:t>lose</a:t>
             </a:r>
           </a:p>
         </p:txBody>
@@ -5433,7 +4811,7 @@
     </p:spTree>
     <p:extLst>
       <p:ext uri="{BB962C8B-B14F-4D97-AF65-F5344CB8AC3E}">
-        <p14:creationId xmlns:p14="http://schemas.microsoft.com/office/powerpoint/2010/main" val="3056458919"/>
+        <p14:creationId xmlns:p14="http://schemas.microsoft.com/office/powerpoint/2010/main" val="3980687860"/>
       </p:ext>
     </p:extLst>
   </p:cSld>
@@ -5465,6 +4843,851 @@
           <p:cNvPr id="2" name="Title 1">
             <a:extLst>
               <a:ext uri="{FF2B5EF4-FFF2-40B4-BE49-F238E27FC236}">
+                <a16:creationId xmlns:a16="http://schemas.microsoft.com/office/drawing/2014/main" id="{0C5946EC-8FD6-4715-AB82-CEF9D32F2FA7}"/>
+              </a:ext>
+            </a:extLst>
+          </p:cNvPr>
+          <p:cNvSpPr>
+            <a:spLocks noGrp="1"/>
+          </p:cNvSpPr>
+          <p:nvPr>
+            <p:ph type="title"/>
+          </p:nvPr>
+        </p:nvSpPr>
+        <p:spPr/>
+        <p:txBody>
+          <a:bodyPr/>
+          <a:lstStyle/>
+          <a:p>
+            <a:r>
+              <a:rPr lang="en-US" dirty="0"/>
+              <a:t>Load balance</a:t>
+            </a:r>
+          </a:p>
+        </p:txBody>
+      </p:sp>
+      <p:sp>
+        <p:nvSpPr>
+          <p:cNvPr id="3" name="Content Placeholder 2">
+            <a:extLst>
+              <a:ext uri="{FF2B5EF4-FFF2-40B4-BE49-F238E27FC236}">
+                <a16:creationId xmlns:a16="http://schemas.microsoft.com/office/drawing/2014/main" id="{05152C54-ED93-404F-9D18-D9D5C9326A35}"/>
+              </a:ext>
+            </a:extLst>
+          </p:cNvPr>
+          <p:cNvSpPr>
+            <a:spLocks noGrp="1"/>
+          </p:cNvSpPr>
+          <p:nvPr>
+            <p:ph idx="1"/>
+          </p:nvPr>
+        </p:nvSpPr>
+        <p:spPr/>
+        <p:txBody>
+          <a:bodyPr/>
+          <a:lstStyle/>
+          <a:p>
+            <a:r>
+              <a:rPr lang="en-US" dirty="0"/>
+              <a:t>Each worker register its workload info to </a:t>
+            </a:r>
+            <a:r>
+              <a:rPr lang="en-US" dirty="0" err="1"/>
+              <a:t>etcd</a:t>
+            </a:r>
+            <a:r>
+              <a:rPr lang="en-US" dirty="0"/>
+              <a:t> periodically</a:t>
+            </a:r>
+          </a:p>
+          <a:p>
+            <a:r>
+              <a:rPr lang="en-US" dirty="0"/>
+              <a:t>Master watched the workload info select the most idle worker</a:t>
+            </a:r>
+          </a:p>
+          <a:p>
+            <a:r>
+              <a:rPr lang="en-US" dirty="0"/>
+              <a:t>When run job, if not specify worker, assign to the most idle worker</a:t>
+            </a:r>
+          </a:p>
+          <a:p>
+            <a:endParaRPr lang="en-US" dirty="0"/>
+          </a:p>
+        </p:txBody>
+      </p:sp>
+      <p:sp>
+        <p:nvSpPr>
+          <p:cNvPr id="4" name="Oval 3">
+            <a:extLst>
+              <a:ext uri="{FF2B5EF4-FFF2-40B4-BE49-F238E27FC236}">
+                <a16:creationId xmlns:a16="http://schemas.microsoft.com/office/drawing/2014/main" id="{05851DB7-1B70-4FF6-807F-78B53BD7C874}"/>
+              </a:ext>
+            </a:extLst>
+          </p:cNvPr>
+          <p:cNvSpPr/>
+          <p:nvPr/>
+        </p:nvSpPr>
+        <p:spPr>
+          <a:xfrm>
+            <a:off x="1524806" y="3692212"/>
+            <a:ext cx="1215959" cy="757454"/>
+          </a:xfrm>
+          <a:prstGeom prst="ellipse">
+            <a:avLst/>
+          </a:prstGeom>
+        </p:spPr>
+        <p:style>
+          <a:lnRef idx="2">
+            <a:schemeClr val="accent1">
+              <a:shade val="50000"/>
+            </a:schemeClr>
+          </a:lnRef>
+          <a:fillRef idx="1">
+            <a:schemeClr val="accent1"/>
+          </a:fillRef>
+          <a:effectRef idx="0">
+            <a:schemeClr val="accent1"/>
+          </a:effectRef>
+          <a:fontRef idx="minor">
+            <a:schemeClr val="lt1"/>
+          </a:fontRef>
+        </p:style>
+        <p:txBody>
+          <a:bodyPr rtlCol="0" anchor="ctr"/>
+          <a:lstStyle/>
+          <a:p>
+            <a:pPr algn="ctr"/>
+            <a:r>
+              <a:rPr lang="en-US" dirty="0"/>
+              <a:t>worker</a:t>
+            </a:r>
+          </a:p>
+          <a:p>
+            <a:pPr algn="ctr"/>
+            <a:r>
+              <a:rPr lang="en-US" dirty="0" err="1"/>
+              <a:t>weliu</a:t>
+            </a:r>
+            <a:endParaRPr lang="en-US" dirty="0"/>
+          </a:p>
+        </p:txBody>
+      </p:sp>
+      <p:sp>
+        <p:nvSpPr>
+          <p:cNvPr id="5" name="Oval 4">
+            <a:extLst>
+              <a:ext uri="{FF2B5EF4-FFF2-40B4-BE49-F238E27FC236}">
+                <a16:creationId xmlns:a16="http://schemas.microsoft.com/office/drawing/2014/main" id="{FFBD6D44-8A49-42B2-9D85-04107BC54A40}"/>
+              </a:ext>
+            </a:extLst>
+          </p:cNvPr>
+          <p:cNvSpPr/>
+          <p:nvPr/>
+        </p:nvSpPr>
+        <p:spPr>
+          <a:xfrm>
+            <a:off x="1524808" y="5732438"/>
+            <a:ext cx="1293778" cy="768513"/>
+          </a:xfrm>
+          <a:prstGeom prst="ellipse">
+            <a:avLst/>
+          </a:prstGeom>
+        </p:spPr>
+        <p:style>
+          <a:lnRef idx="2">
+            <a:schemeClr val="accent1">
+              <a:shade val="50000"/>
+            </a:schemeClr>
+          </a:lnRef>
+          <a:fillRef idx="1">
+            <a:schemeClr val="accent1"/>
+          </a:fillRef>
+          <a:effectRef idx="0">
+            <a:schemeClr val="accent1"/>
+          </a:effectRef>
+          <a:fontRef idx="minor">
+            <a:schemeClr val="lt1"/>
+          </a:fontRef>
+        </p:style>
+        <p:txBody>
+          <a:bodyPr rtlCol="0" anchor="ctr"/>
+          <a:lstStyle/>
+          <a:p>
+            <a:pPr algn="ctr"/>
+            <a:r>
+              <a:rPr lang="en-US" dirty="0"/>
+              <a:t>worker </a:t>
+            </a:r>
+            <a:r>
+              <a:rPr lang="en-US" dirty="0" err="1"/>
+              <a:t>wenzhe</a:t>
+            </a:r>
+            <a:endParaRPr lang="en-US" dirty="0"/>
+          </a:p>
+        </p:txBody>
+      </p:sp>
+      <p:sp>
+        <p:nvSpPr>
+          <p:cNvPr id="6" name="Rectangle 5">
+            <a:extLst>
+              <a:ext uri="{FF2B5EF4-FFF2-40B4-BE49-F238E27FC236}">
+                <a16:creationId xmlns:a16="http://schemas.microsoft.com/office/drawing/2014/main" id="{1FAD72E8-3029-493D-B2ED-73F072CAF29B}"/>
+              </a:ext>
+            </a:extLst>
+          </p:cNvPr>
+          <p:cNvSpPr/>
+          <p:nvPr/>
+        </p:nvSpPr>
+        <p:spPr>
+          <a:xfrm>
+            <a:off x="3986717" y="3775491"/>
+            <a:ext cx="2491904" cy="590895"/>
+          </a:xfrm>
+          <a:prstGeom prst="rect">
+            <a:avLst/>
+          </a:prstGeom>
+        </p:spPr>
+        <p:style>
+          <a:lnRef idx="2">
+            <a:schemeClr val="accent1">
+              <a:shade val="50000"/>
+            </a:schemeClr>
+          </a:lnRef>
+          <a:fillRef idx="1">
+            <a:schemeClr val="accent1"/>
+          </a:fillRef>
+          <a:effectRef idx="0">
+            <a:schemeClr val="accent1"/>
+          </a:effectRef>
+          <a:fontRef idx="minor">
+            <a:schemeClr val="lt1"/>
+          </a:fontRef>
+        </p:style>
+        <p:txBody>
+          <a:bodyPr rtlCol="0" anchor="ctr"/>
+          <a:lstStyle/>
+          <a:p>
+            <a:pPr algn="ctr"/>
+            <a:r>
+              <a:rPr lang="en-US" dirty="0" err="1"/>
+              <a:t>crms</a:t>
+            </a:r>
+            <a:r>
+              <a:rPr lang="en-US" dirty="0"/>
+              <a:t>/workload/</a:t>
+            </a:r>
+            <a:r>
+              <a:rPr lang="en-US" dirty="0" err="1"/>
+              <a:t>weliu</a:t>
+            </a:r>
+            <a:endParaRPr lang="en-US" dirty="0"/>
+          </a:p>
+          <a:p>
+            <a:pPr algn="ctr"/>
+            <a:r>
+              <a:rPr lang="en-US" dirty="0"/>
+              <a:t>Workload info</a:t>
+            </a:r>
+          </a:p>
+        </p:txBody>
+      </p:sp>
+      <p:sp>
+        <p:nvSpPr>
+          <p:cNvPr id="7" name="Rectangle 6">
+            <a:extLst>
+              <a:ext uri="{FF2B5EF4-FFF2-40B4-BE49-F238E27FC236}">
+                <a16:creationId xmlns:a16="http://schemas.microsoft.com/office/drawing/2014/main" id="{76083FD9-F604-4AE8-A28C-F16ACD4E8919}"/>
+              </a:ext>
+            </a:extLst>
+          </p:cNvPr>
+          <p:cNvSpPr/>
+          <p:nvPr/>
+        </p:nvSpPr>
+        <p:spPr>
+          <a:xfrm>
+            <a:off x="4064538" y="5839555"/>
+            <a:ext cx="2491904" cy="554280"/>
+          </a:xfrm>
+          <a:prstGeom prst="rect">
+            <a:avLst/>
+          </a:prstGeom>
+        </p:spPr>
+        <p:style>
+          <a:lnRef idx="2">
+            <a:schemeClr val="accent1">
+              <a:shade val="50000"/>
+            </a:schemeClr>
+          </a:lnRef>
+          <a:fillRef idx="1">
+            <a:schemeClr val="accent1"/>
+          </a:fillRef>
+          <a:effectRef idx="0">
+            <a:schemeClr val="accent1"/>
+          </a:effectRef>
+          <a:fontRef idx="minor">
+            <a:schemeClr val="lt1"/>
+          </a:fontRef>
+        </p:style>
+        <p:txBody>
+          <a:bodyPr rtlCol="0" anchor="ctr"/>
+          <a:lstStyle/>
+          <a:p>
+            <a:pPr algn="ctr"/>
+            <a:r>
+              <a:rPr lang="en-US" dirty="0" err="1"/>
+              <a:t>crms</a:t>
+            </a:r>
+            <a:r>
+              <a:rPr lang="en-US" dirty="0"/>
+              <a:t>/workload/</a:t>
+            </a:r>
+            <a:r>
+              <a:rPr lang="en-US" dirty="0" err="1"/>
+              <a:t>wenzhe</a:t>
+            </a:r>
+            <a:endParaRPr lang="en-US" dirty="0"/>
+          </a:p>
+          <a:p>
+            <a:pPr algn="ctr"/>
+            <a:r>
+              <a:rPr lang="en-US" dirty="0"/>
+              <a:t>Workload info</a:t>
+            </a:r>
+          </a:p>
+        </p:txBody>
+      </p:sp>
+      <p:sp>
+        <p:nvSpPr>
+          <p:cNvPr id="8" name="Oval 7">
+            <a:extLst>
+              <a:ext uri="{FF2B5EF4-FFF2-40B4-BE49-F238E27FC236}">
+                <a16:creationId xmlns:a16="http://schemas.microsoft.com/office/drawing/2014/main" id="{8EEE84CD-E184-4CD0-A5B5-394363395ED9}"/>
+              </a:ext>
+            </a:extLst>
+          </p:cNvPr>
+          <p:cNvSpPr/>
+          <p:nvPr/>
+        </p:nvSpPr>
+        <p:spPr>
+          <a:xfrm>
+            <a:off x="8009106" y="4693481"/>
+            <a:ext cx="1293778" cy="768513"/>
+          </a:xfrm>
+          <a:prstGeom prst="ellipse">
+            <a:avLst/>
+          </a:prstGeom>
+        </p:spPr>
+        <p:style>
+          <a:lnRef idx="2">
+            <a:schemeClr val="accent1">
+              <a:shade val="50000"/>
+            </a:schemeClr>
+          </a:lnRef>
+          <a:fillRef idx="1">
+            <a:schemeClr val="accent1"/>
+          </a:fillRef>
+          <a:effectRef idx="0">
+            <a:schemeClr val="accent1"/>
+          </a:effectRef>
+          <a:fontRef idx="minor">
+            <a:schemeClr val="lt1"/>
+          </a:fontRef>
+        </p:style>
+        <p:txBody>
+          <a:bodyPr rtlCol="0" anchor="ctr"/>
+          <a:lstStyle/>
+          <a:p>
+            <a:pPr algn="ctr"/>
+            <a:r>
+              <a:rPr lang="en-US" dirty="0"/>
+              <a:t>master leader</a:t>
+            </a:r>
+          </a:p>
+        </p:txBody>
+      </p:sp>
+      <p:cxnSp>
+        <p:nvCxnSpPr>
+          <p:cNvPr id="10" name="Straight Arrow Connector 9">
+            <a:extLst>
+              <a:ext uri="{FF2B5EF4-FFF2-40B4-BE49-F238E27FC236}">
+                <a16:creationId xmlns:a16="http://schemas.microsoft.com/office/drawing/2014/main" id="{C54C8FFE-5EF8-4502-9CD0-AEE0A9D3BAE3}"/>
+              </a:ext>
+            </a:extLst>
+          </p:cNvPr>
+          <p:cNvCxnSpPr>
+            <a:stCxn id="4" idx="6"/>
+            <a:endCxn id="6" idx="1"/>
+          </p:cNvCxnSpPr>
+          <p:nvPr/>
+        </p:nvCxnSpPr>
+        <p:spPr>
+          <a:xfrm>
+            <a:off x="2740765" y="4070939"/>
+            <a:ext cx="1245952" cy="0"/>
+          </a:xfrm>
+          <a:prstGeom prst="straightConnector1">
+            <a:avLst/>
+          </a:prstGeom>
+          <a:ln>
+            <a:tailEnd type="triangle"/>
+          </a:ln>
+        </p:spPr>
+        <p:style>
+          <a:lnRef idx="1">
+            <a:schemeClr val="accent1"/>
+          </a:lnRef>
+          <a:fillRef idx="0">
+            <a:schemeClr val="accent1"/>
+          </a:fillRef>
+          <a:effectRef idx="0">
+            <a:schemeClr val="accent1"/>
+          </a:effectRef>
+          <a:fontRef idx="minor">
+            <a:schemeClr val="tx1"/>
+          </a:fontRef>
+        </p:style>
+      </p:cxnSp>
+      <p:cxnSp>
+        <p:nvCxnSpPr>
+          <p:cNvPr id="12" name="Straight Arrow Connector 11">
+            <a:extLst>
+              <a:ext uri="{FF2B5EF4-FFF2-40B4-BE49-F238E27FC236}">
+                <a16:creationId xmlns:a16="http://schemas.microsoft.com/office/drawing/2014/main" id="{365F017F-229B-4AB7-B97B-124D22202BB8}"/>
+              </a:ext>
+            </a:extLst>
+          </p:cNvPr>
+          <p:cNvCxnSpPr>
+            <a:stCxn id="5" idx="6"/>
+            <a:endCxn id="7" idx="1"/>
+          </p:cNvCxnSpPr>
+          <p:nvPr/>
+        </p:nvCxnSpPr>
+        <p:spPr>
+          <a:xfrm>
+            <a:off x="2818586" y="6116695"/>
+            <a:ext cx="1245952" cy="0"/>
+          </a:xfrm>
+          <a:prstGeom prst="straightConnector1">
+            <a:avLst/>
+          </a:prstGeom>
+          <a:ln>
+            <a:tailEnd type="triangle"/>
+          </a:ln>
+        </p:spPr>
+        <p:style>
+          <a:lnRef idx="1">
+            <a:schemeClr val="accent1"/>
+          </a:lnRef>
+          <a:fillRef idx="0">
+            <a:schemeClr val="accent1"/>
+          </a:fillRef>
+          <a:effectRef idx="0">
+            <a:schemeClr val="accent1"/>
+          </a:effectRef>
+          <a:fontRef idx="minor">
+            <a:schemeClr val="tx1"/>
+          </a:fontRef>
+        </p:style>
+      </p:cxnSp>
+      <p:cxnSp>
+        <p:nvCxnSpPr>
+          <p:cNvPr id="14" name="Straight Arrow Connector 13">
+            <a:extLst>
+              <a:ext uri="{FF2B5EF4-FFF2-40B4-BE49-F238E27FC236}">
+                <a16:creationId xmlns:a16="http://schemas.microsoft.com/office/drawing/2014/main" id="{55BDD150-E550-457C-9E04-30A424595B43}"/>
+              </a:ext>
+            </a:extLst>
+          </p:cNvPr>
+          <p:cNvCxnSpPr>
+            <a:stCxn id="6" idx="3"/>
+            <a:endCxn id="8" idx="1"/>
+          </p:cNvCxnSpPr>
+          <p:nvPr/>
+        </p:nvCxnSpPr>
+        <p:spPr>
+          <a:xfrm>
+            <a:off x="6478621" y="4070939"/>
+            <a:ext cx="1719954" cy="735088"/>
+          </a:xfrm>
+          <a:prstGeom prst="straightConnector1">
+            <a:avLst/>
+          </a:prstGeom>
+          <a:ln>
+            <a:tailEnd type="triangle"/>
+          </a:ln>
+        </p:spPr>
+        <p:style>
+          <a:lnRef idx="1">
+            <a:schemeClr val="accent1"/>
+          </a:lnRef>
+          <a:fillRef idx="0">
+            <a:schemeClr val="accent1"/>
+          </a:fillRef>
+          <a:effectRef idx="0">
+            <a:schemeClr val="accent1"/>
+          </a:effectRef>
+          <a:fontRef idx="minor">
+            <a:schemeClr val="tx1"/>
+          </a:fontRef>
+        </p:style>
+      </p:cxnSp>
+      <p:cxnSp>
+        <p:nvCxnSpPr>
+          <p:cNvPr id="16" name="Straight Arrow Connector 15">
+            <a:extLst>
+              <a:ext uri="{FF2B5EF4-FFF2-40B4-BE49-F238E27FC236}">
+                <a16:creationId xmlns:a16="http://schemas.microsoft.com/office/drawing/2014/main" id="{959ECF60-B0BF-49A5-BD18-557D265F89A2}"/>
+              </a:ext>
+            </a:extLst>
+          </p:cNvPr>
+          <p:cNvCxnSpPr>
+            <a:stCxn id="7" idx="3"/>
+            <a:endCxn id="8" idx="3"/>
+          </p:cNvCxnSpPr>
+          <p:nvPr/>
+        </p:nvCxnSpPr>
+        <p:spPr>
+          <a:xfrm flipV="1">
+            <a:off x="6556442" y="5349448"/>
+            <a:ext cx="1642133" cy="767247"/>
+          </a:xfrm>
+          <a:prstGeom prst="straightConnector1">
+            <a:avLst/>
+          </a:prstGeom>
+          <a:ln>
+            <a:tailEnd type="triangle"/>
+          </a:ln>
+        </p:spPr>
+        <p:style>
+          <a:lnRef idx="1">
+            <a:schemeClr val="accent1"/>
+          </a:lnRef>
+          <a:fillRef idx="0">
+            <a:schemeClr val="accent1"/>
+          </a:fillRef>
+          <a:effectRef idx="0">
+            <a:schemeClr val="accent1"/>
+          </a:effectRef>
+          <a:fontRef idx="minor">
+            <a:schemeClr val="tx1"/>
+          </a:fontRef>
+        </p:style>
+      </p:cxnSp>
+      <p:sp>
+        <p:nvSpPr>
+          <p:cNvPr id="21" name="Rectangle 20">
+            <a:extLst>
+              <a:ext uri="{FF2B5EF4-FFF2-40B4-BE49-F238E27FC236}">
+                <a16:creationId xmlns:a16="http://schemas.microsoft.com/office/drawing/2014/main" id="{FC05C6AD-26CE-492D-BD08-B9FFCC115E98}"/>
+              </a:ext>
+            </a:extLst>
+          </p:cNvPr>
+          <p:cNvSpPr/>
+          <p:nvPr/>
+        </p:nvSpPr>
+        <p:spPr>
+          <a:xfrm>
+            <a:off x="3986717" y="4782289"/>
+            <a:ext cx="2491904" cy="590895"/>
+          </a:xfrm>
+          <a:prstGeom prst="rect">
+            <a:avLst/>
+          </a:prstGeom>
+        </p:spPr>
+        <p:style>
+          <a:lnRef idx="2">
+            <a:schemeClr val="accent1">
+              <a:shade val="50000"/>
+            </a:schemeClr>
+          </a:lnRef>
+          <a:fillRef idx="1">
+            <a:schemeClr val="accent1"/>
+          </a:fillRef>
+          <a:effectRef idx="0">
+            <a:schemeClr val="accent1"/>
+          </a:effectRef>
+          <a:fontRef idx="minor">
+            <a:schemeClr val="lt1"/>
+          </a:fontRef>
+        </p:style>
+        <p:txBody>
+          <a:bodyPr rtlCol="0" anchor="ctr"/>
+          <a:lstStyle/>
+          <a:p>
+            <a:pPr algn="ctr"/>
+            <a:r>
+              <a:rPr lang="en-US" dirty="0" err="1"/>
+              <a:t>crms</a:t>
+            </a:r>
+            <a:r>
+              <a:rPr lang="en-US" dirty="0"/>
+              <a:t>/workload</a:t>
+            </a:r>
+          </a:p>
+          <a:p>
+            <a:pPr algn="ctr"/>
+            <a:r>
+              <a:rPr lang="en-US" dirty="0" err="1"/>
+              <a:t>wenzhe</a:t>
+            </a:r>
+            <a:endParaRPr lang="en-US" dirty="0"/>
+          </a:p>
+        </p:txBody>
+      </p:sp>
+      <p:cxnSp>
+        <p:nvCxnSpPr>
+          <p:cNvPr id="25" name="Straight Arrow Connector 24">
+            <a:extLst>
+              <a:ext uri="{FF2B5EF4-FFF2-40B4-BE49-F238E27FC236}">
+                <a16:creationId xmlns:a16="http://schemas.microsoft.com/office/drawing/2014/main" id="{B3453D6C-D317-41BF-BDAC-C8CECE143B7C}"/>
+              </a:ext>
+            </a:extLst>
+          </p:cNvPr>
+          <p:cNvCxnSpPr>
+            <a:stCxn id="8" idx="2"/>
+            <a:endCxn id="21" idx="3"/>
+          </p:cNvCxnSpPr>
+          <p:nvPr/>
+        </p:nvCxnSpPr>
+        <p:spPr>
+          <a:xfrm flipH="1" flipV="1">
+            <a:off x="6478621" y="5077737"/>
+            <a:ext cx="1530485" cy="1"/>
+          </a:xfrm>
+          <a:prstGeom prst="straightConnector1">
+            <a:avLst/>
+          </a:prstGeom>
+          <a:ln>
+            <a:tailEnd type="triangle"/>
+          </a:ln>
+        </p:spPr>
+        <p:style>
+          <a:lnRef idx="1">
+            <a:schemeClr val="accent1"/>
+          </a:lnRef>
+          <a:fillRef idx="0">
+            <a:schemeClr val="accent1"/>
+          </a:fillRef>
+          <a:effectRef idx="0">
+            <a:schemeClr val="accent1"/>
+          </a:effectRef>
+          <a:fontRef idx="minor">
+            <a:schemeClr val="tx1"/>
+          </a:fontRef>
+        </p:style>
+      </p:cxnSp>
+      <p:sp>
+        <p:nvSpPr>
+          <p:cNvPr id="26" name="TextBox 25">
+            <a:extLst>
+              <a:ext uri="{FF2B5EF4-FFF2-40B4-BE49-F238E27FC236}">
+                <a16:creationId xmlns:a16="http://schemas.microsoft.com/office/drawing/2014/main" id="{0C322D60-B456-4CD0-AD0C-81D320F4280B}"/>
+              </a:ext>
+            </a:extLst>
+          </p:cNvPr>
+          <p:cNvSpPr txBox="1"/>
+          <p:nvPr/>
+        </p:nvSpPr>
+        <p:spPr>
+          <a:xfrm>
+            <a:off x="7338598" y="4164564"/>
+            <a:ext cx="1299074" cy="369332"/>
+          </a:xfrm>
+          <a:prstGeom prst="rect">
+            <a:avLst/>
+          </a:prstGeom>
+          <a:noFill/>
+        </p:spPr>
+        <p:txBody>
+          <a:bodyPr wrap="none" rtlCol="0">
+            <a:spAutoFit/>
+          </a:bodyPr>
+          <a:lstStyle/>
+          <a:p>
+            <a:r>
+              <a:rPr lang="en-US" dirty="0"/>
+              <a:t>Watched by</a:t>
+            </a:r>
+          </a:p>
+        </p:txBody>
+      </p:sp>
+      <p:sp>
+        <p:nvSpPr>
+          <p:cNvPr id="27" name="TextBox 26">
+            <a:extLst>
+              <a:ext uri="{FF2B5EF4-FFF2-40B4-BE49-F238E27FC236}">
+                <a16:creationId xmlns:a16="http://schemas.microsoft.com/office/drawing/2014/main" id="{51131A28-34CF-4435-839B-FA380478BA1E}"/>
+              </a:ext>
+            </a:extLst>
+          </p:cNvPr>
+          <p:cNvSpPr txBox="1"/>
+          <p:nvPr/>
+        </p:nvSpPr>
+        <p:spPr>
+          <a:xfrm>
+            <a:off x="7243863" y="5837765"/>
+            <a:ext cx="1299074" cy="369332"/>
+          </a:xfrm>
+          <a:prstGeom prst="rect">
+            <a:avLst/>
+          </a:prstGeom>
+          <a:noFill/>
+        </p:spPr>
+        <p:txBody>
+          <a:bodyPr wrap="none" rtlCol="0">
+            <a:spAutoFit/>
+          </a:bodyPr>
+          <a:lstStyle/>
+          <a:p>
+            <a:r>
+              <a:rPr lang="en-US" dirty="0"/>
+              <a:t>Watched by</a:t>
+            </a:r>
+          </a:p>
+        </p:txBody>
+      </p:sp>
+      <p:sp>
+        <p:nvSpPr>
+          <p:cNvPr id="28" name="TextBox 27">
+            <a:extLst>
+              <a:ext uri="{FF2B5EF4-FFF2-40B4-BE49-F238E27FC236}">
+                <a16:creationId xmlns:a16="http://schemas.microsoft.com/office/drawing/2014/main" id="{83129C3D-8AFE-4B04-B29D-77B9CB4646E0}"/>
+              </a:ext>
+            </a:extLst>
+          </p:cNvPr>
+          <p:cNvSpPr txBox="1"/>
+          <p:nvPr/>
+        </p:nvSpPr>
+        <p:spPr>
+          <a:xfrm>
+            <a:off x="3011141" y="3701606"/>
+            <a:ext cx="505267" cy="369332"/>
+          </a:xfrm>
+          <a:prstGeom prst="rect">
+            <a:avLst/>
+          </a:prstGeom>
+          <a:noFill/>
+        </p:spPr>
+        <p:txBody>
+          <a:bodyPr wrap="none" rtlCol="0">
+            <a:spAutoFit/>
+          </a:bodyPr>
+          <a:lstStyle/>
+          <a:p>
+            <a:r>
+              <a:rPr lang="en-US" dirty="0"/>
+              <a:t>put</a:t>
+            </a:r>
+          </a:p>
+        </p:txBody>
+      </p:sp>
+      <p:sp>
+        <p:nvSpPr>
+          <p:cNvPr id="29" name="TextBox 28">
+            <a:extLst>
+              <a:ext uri="{FF2B5EF4-FFF2-40B4-BE49-F238E27FC236}">
+                <a16:creationId xmlns:a16="http://schemas.microsoft.com/office/drawing/2014/main" id="{40216B23-38E0-400E-8F2E-FE5F5A230E20}"/>
+              </a:ext>
+            </a:extLst>
+          </p:cNvPr>
+          <p:cNvSpPr txBox="1"/>
+          <p:nvPr/>
+        </p:nvSpPr>
+        <p:spPr>
+          <a:xfrm>
+            <a:off x="3031692" y="5743062"/>
+            <a:ext cx="505267" cy="369332"/>
+          </a:xfrm>
+          <a:prstGeom prst="rect">
+            <a:avLst/>
+          </a:prstGeom>
+          <a:noFill/>
+        </p:spPr>
+        <p:txBody>
+          <a:bodyPr wrap="none" rtlCol="0">
+            <a:spAutoFit/>
+          </a:bodyPr>
+          <a:lstStyle/>
+          <a:p>
+            <a:r>
+              <a:rPr lang="en-US" dirty="0"/>
+              <a:t>put</a:t>
+            </a:r>
+          </a:p>
+        </p:txBody>
+      </p:sp>
+      <p:sp>
+        <p:nvSpPr>
+          <p:cNvPr id="30" name="TextBox 29">
+            <a:extLst>
+              <a:ext uri="{FF2B5EF4-FFF2-40B4-BE49-F238E27FC236}">
+                <a16:creationId xmlns:a16="http://schemas.microsoft.com/office/drawing/2014/main" id="{DD46242D-B793-45E1-B879-006710F06BFA}"/>
+              </a:ext>
+            </a:extLst>
+          </p:cNvPr>
+          <p:cNvSpPr txBox="1"/>
+          <p:nvPr/>
+        </p:nvSpPr>
+        <p:spPr>
+          <a:xfrm>
+            <a:off x="6991229" y="4701154"/>
+            <a:ext cx="505267" cy="369332"/>
+          </a:xfrm>
+          <a:prstGeom prst="rect">
+            <a:avLst/>
+          </a:prstGeom>
+          <a:noFill/>
+        </p:spPr>
+        <p:txBody>
+          <a:bodyPr wrap="none" rtlCol="0">
+            <a:spAutoFit/>
+          </a:bodyPr>
+          <a:lstStyle/>
+          <a:p>
+            <a:r>
+              <a:rPr lang="en-US" dirty="0"/>
+              <a:t>put</a:t>
+            </a:r>
+          </a:p>
+        </p:txBody>
+      </p:sp>
+    </p:spTree>
+    <p:extLst>
+      <p:ext uri="{BB962C8B-B14F-4D97-AF65-F5344CB8AC3E}">
+        <p14:creationId xmlns:p14="http://schemas.microsoft.com/office/powerpoint/2010/main" val="3056458919"/>
+      </p:ext>
+    </p:extLst>
+  </p:cSld>
+  <p:clrMapOvr>
+    <a:masterClrMapping/>
+  </p:clrMapOvr>
+</p:sld>
+</file>
+
+<file path=ppt/slides/slide15.xml><?xml version="1.0" encoding="utf-8"?>
+<p:sld xmlns:a="http://schemas.openxmlformats.org/drawingml/2006/main" xmlns:r="http://schemas.openxmlformats.org/officeDocument/2006/relationships" xmlns:p="http://schemas.openxmlformats.org/presentationml/2006/main">
+  <p:cSld>
+    <p:spTree>
+      <p:nvGrpSpPr>
+        <p:cNvPr id="1" name=""/>
+        <p:cNvGrpSpPr/>
+        <p:nvPr/>
+      </p:nvGrpSpPr>
+      <p:grpSpPr>
+        <a:xfrm>
+          <a:off x="0" y="0"/>
+          <a:ext cx="0" cy="0"/>
+          <a:chOff x="0" y="0"/>
+          <a:chExt cx="0" cy="0"/>
+        </a:xfrm>
+      </p:grpSpPr>
+      <p:sp>
+        <p:nvSpPr>
+          <p:cNvPr id="2" name="Title 1">
+            <a:extLst>
+              <a:ext uri="{FF2B5EF4-FFF2-40B4-BE49-F238E27FC236}">
                 <a16:creationId xmlns:a16="http://schemas.microsoft.com/office/drawing/2014/main" id="{F12EDF6B-CF39-469F-91C0-0B10D7E57AFE}"/>
               </a:ext>
             </a:extLst>
@@ -5539,7 +5762,7 @@
 </p:sld>
 </file>
 
-<file path=ppt/slides/slide15.xml><?xml version="1.0" encoding="utf-8"?>
+<file path=ppt/slides/slide16.xml><?xml version="1.0" encoding="utf-8"?>
 <p:sld xmlns:a="http://schemas.openxmlformats.org/drawingml/2006/main" xmlns:r="http://schemas.openxmlformats.org/officeDocument/2006/relationships" xmlns:p="http://schemas.openxmlformats.org/presentationml/2006/main">
   <p:cSld>
     <p:spTree>
@@ -7150,7 +7373,7 @@
         <p:spPr>
           <a:xfrm>
             <a:off x="5547881" y="2637426"/>
-            <a:ext cx="516039" cy="369332"/>
+            <a:ext cx="516808" cy="369332"/>
           </a:xfrm>
           <a:prstGeom prst="rect">
             <a:avLst/>
@@ -7164,10 +7387,9 @@
           <a:lstStyle/>
           <a:p>
             <a:r>
-              <a:rPr lang="en-US" dirty="0" err="1"/>
-              <a:t>ratf</a:t>
-            </a:r>
-            <a:endParaRPr lang="en-US" dirty="0"/>
+              <a:rPr lang="en-US" dirty="0"/>
+              <a:t>raft</a:t>
+            </a:r>
           </a:p>
         </p:txBody>
       </p:sp>
@@ -9797,10 +10019,15 @@
             <p:ph idx="1"/>
           </p:nvPr>
         </p:nvSpPr>
-        <p:spPr/>
+        <p:spPr>
+          <a:xfrm>
+            <a:off x="838200" y="1825625"/>
+            <a:ext cx="10515600" cy="4662724"/>
+          </a:xfrm>
+        </p:spPr>
         <p:txBody>
           <a:bodyPr>
-            <a:normAutofit fontScale="92500" lnSpcReduction="20000"/>
+            <a:normAutofit fontScale="85000" lnSpcReduction="20000"/>
           </a:bodyPr>
           <a:lstStyle/>
           <a:p>
@@ -9862,6 +10089,19 @@
             <a:r>
               <a:rPr lang="en-US" dirty="0"/>
               <a:t>Data node remove automatically, listeners knows</a:t>
+            </a:r>
+          </a:p>
+          <a:p>
+            <a:r>
+              <a:rPr lang="en-US" dirty="0"/>
+              <a:t>Watch temp data node</a:t>
+            </a:r>
+          </a:p>
+          <a:p>
+            <a:pPr lvl="1"/>
+            <a:r>
+              <a:rPr lang="en-US" dirty="0"/>
+              <a:t>If receive value: “close”, then shutdown itself gracefully</a:t>
             </a:r>
           </a:p>
           <a:p>
@@ -10267,7 +10507,7 @@
           <a:p>
             <a:r>
               <a:rPr lang="en-US" dirty="0"/>
-              <a:t>Check jobs that has been handling by a worker</a:t>
+              <a:t>Check jobs that are being handled by a worker</a:t>
             </a:r>
           </a:p>
           <a:p>
@@ -12799,7 +13039,7 @@
         <p:spPr>
           <a:xfrm>
             <a:off x="10987369" y="1216203"/>
-            <a:ext cx="516039" cy="369332"/>
+            <a:ext cx="516808" cy="369332"/>
           </a:xfrm>
           <a:prstGeom prst="rect">
             <a:avLst/>
@@ -12813,10 +13053,9 @@
           <a:lstStyle/>
           <a:p>
             <a:r>
-              <a:rPr lang="en-US" dirty="0" err="1"/>
-              <a:t>ratf</a:t>
-            </a:r>
-            <a:endParaRPr lang="en-US" dirty="0"/>
+              <a:rPr lang="en-US" dirty="0"/>
+              <a:t>raft</a:t>
+            </a:r>
           </a:p>
         </p:txBody>
       </p:sp>
@@ -13601,7 +13840,7 @@
         <p:spPr>
           <a:xfrm>
             <a:off x="10987369" y="1216203"/>
-            <a:ext cx="516039" cy="369332"/>
+            <a:ext cx="516808" cy="369332"/>
           </a:xfrm>
           <a:prstGeom prst="rect">
             <a:avLst/>
@@ -13615,10 +13854,9 @@
           <a:lstStyle/>
           <a:p>
             <a:r>
-              <a:rPr lang="en-US" dirty="0" err="1"/>
-              <a:t>ratf</a:t>
-            </a:r>
-            <a:endParaRPr lang="en-US" dirty="0"/>
+              <a:rPr lang="en-US" dirty="0"/>
+              <a:t>raft</a:t>
+            </a:r>
           </a:p>
         </p:txBody>
       </p:sp>
@@ -14346,7 +14584,7 @@
         <p:spPr>
           <a:xfrm>
             <a:off x="11074918" y="973007"/>
-            <a:ext cx="516039" cy="369332"/>
+            <a:ext cx="516808" cy="369332"/>
           </a:xfrm>
           <a:prstGeom prst="rect">
             <a:avLst/>
@@ -14360,10 +14598,9 @@
           <a:lstStyle/>
           <a:p>
             <a:r>
-              <a:rPr lang="en-US" dirty="0" err="1"/>
-              <a:t>ratf</a:t>
-            </a:r>
-            <a:endParaRPr lang="en-US" dirty="0"/>
+              <a:rPr lang="en-US" dirty="0"/>
+              <a:t>raft</a:t>
+            </a:r>
           </a:p>
         </p:txBody>
       </p:sp>

</xml_diff>